<commit_message>
Standardised the presentation. Added some slides for Alex.
</commit_message>
<xml_diff>
--- a/resources/presentation1/final_presentation.pptx
+++ b/resources/presentation1/final_presentation.pptx
@@ -6,7 +6,7 @@
     <p:sldMasterId id="2147483661" r:id="rId2"/>
   </p:sldMasterIdLst>
   <p:notesMasterIdLst>
-    <p:notesMasterId r:id="rId31"/>
+    <p:notesMasterId r:id="rId37"/>
   </p:notesMasterIdLst>
   <p:sldIdLst>
     <p:sldId id="271" r:id="rId3"/>
@@ -28,15 +28,21 @@
     <p:sldId id="262" r:id="rId19"/>
     <p:sldId id="288" r:id="rId20"/>
     <p:sldId id="278" r:id="rId21"/>
-    <p:sldId id="279" r:id="rId22"/>
-    <p:sldId id="280" r:id="rId23"/>
-    <p:sldId id="281" r:id="rId24"/>
-    <p:sldId id="282" r:id="rId25"/>
-    <p:sldId id="283" r:id="rId26"/>
-    <p:sldId id="284" r:id="rId27"/>
-    <p:sldId id="285" r:id="rId28"/>
-    <p:sldId id="286" r:id="rId29"/>
-    <p:sldId id="287" r:id="rId30"/>
+    <p:sldId id="289" r:id="rId22"/>
+    <p:sldId id="290" r:id="rId23"/>
+    <p:sldId id="291" r:id="rId24"/>
+    <p:sldId id="279" r:id="rId25"/>
+    <p:sldId id="280" r:id="rId26"/>
+    <p:sldId id="281" r:id="rId27"/>
+    <p:sldId id="292" r:id="rId28"/>
+    <p:sldId id="293" r:id="rId29"/>
+    <p:sldId id="294" r:id="rId30"/>
+    <p:sldId id="282" r:id="rId31"/>
+    <p:sldId id="283" r:id="rId32"/>
+    <p:sldId id="284" r:id="rId33"/>
+    <p:sldId id="285" r:id="rId34"/>
+    <p:sldId id="286" r:id="rId35"/>
+    <p:sldId id="287" r:id="rId36"/>
   </p:sldIdLst>
   <p:sldSz cx="12192000" cy="6858000"/>
   <p:notesSz cx="6858000" cy="9144000"/>
@@ -137,7 +143,18 @@
   </p:defaultTextStyle>
   <p:extLst>
     <p:ext uri="{EFAFB233-063F-42B5-8137-9DF3F51BA10A}">
-      <p15:sldGuideLst xmlns:p15="http://schemas.microsoft.com/office/powerpoint/2012/main" xmlns=""/>
+      <p15:sldGuideLst xmlns:p15="http://schemas.microsoft.com/office/powerpoint/2012/main">
+        <p15:guide id="1" orient="horz" pos="2160">
+          <p15:clr>
+            <a:srgbClr val="A4A3A4"/>
+          </p15:clr>
+        </p15:guide>
+        <p15:guide id="2" pos="3840">
+          <p15:clr>
+            <a:srgbClr val="A4A3A4"/>
+          </p15:clr>
+        </p15:guide>
+      </p15:sldGuideLst>
     </p:ext>
   </p:extLst>
 </p:presentation>
@@ -635,7 +652,7 @@
           <a:p>
             <a:pPr lvl="0"/>
             <a:fld id="{6DD5F923-8CF0-409D-990C-17665D35C858}" type="slidenum">
-              <a:t>26</a:t>
+              <a:t>32</a:t>
             </a:fld>
             <a:endParaRPr lang="en-GB"/>
           </a:p>
@@ -739,7 +756,7 @@
           <a:p>
             <a:pPr lvl="0"/>
             <a:fld id="{484F1371-E931-41F3-8E4C-96917AD29584}" type="slidenum">
-              <a:t>27</a:t>
+              <a:t>33</a:t>
             </a:fld>
             <a:endParaRPr lang="en-GB"/>
           </a:p>
@@ -1353,7 +1370,7 @@
           <a:p>
             <a:pPr lvl="0"/>
             <a:fld id="{DDC9E417-7D99-40E6-93CF-40159C6409E5}" type="slidenum">
-              <a:t>23</a:t>
+              <a:t>29</a:t>
             </a:fld>
             <a:endParaRPr lang="en-GB"/>
           </a:p>
@@ -1459,7 +1476,7 @@
           <a:p>
             <a:pPr lvl="0"/>
             <a:fld id="{913CF9F0-0137-498F-83FB-9E925AC6D187}" type="slidenum">
-              <a:t>24</a:t>
+              <a:t>30</a:t>
             </a:fld>
             <a:endParaRPr lang="en-GB"/>
           </a:p>
@@ -1563,7 +1580,7 @@
           <a:p>
             <a:pPr lvl="0"/>
             <a:fld id="{C7824BA0-D50C-4D09-AC63-C3184AE449DA}" type="slidenum">
-              <a:t>25</a:t>
+              <a:t>31</a:t>
             </a:fld>
             <a:endParaRPr lang="en-GB"/>
           </a:p>
@@ -10025,21 +10042,46 @@
             <p:ph sz="half" idx="2"/>
           </p:nvPr>
         </p:nvSpPr>
-        <p:spPr/>
-        <p:txBody>
-          <a:bodyPr/>
-          <a:lstStyle/>
-          <a:p>
-            <a:r>
-              <a:rPr lang="en-GB" dirty="0" smtClean="0"/>
-              <a:t>5-star rating</a:t>
-            </a:r>
-          </a:p>
-          <a:p>
-            <a:r>
-              <a:rPr lang="en-GB" dirty="0" smtClean="0"/>
-              <a:t>Optional text review</a:t>
-            </a:r>
+        <p:spPr>
+          <a:xfrm>
+            <a:off x="6217920" y="1845735"/>
+            <a:ext cx="5186680" cy="4023360"/>
+          </a:xfrm>
+        </p:spPr>
+        <p:txBody>
+          <a:bodyPr>
+            <a:normAutofit/>
+          </a:bodyPr>
+          <a:lstStyle/>
+          <a:p>
+            <a:pPr lvl="1">
+              <a:buFont typeface="Arial" panose="020B0604020202020204" pitchFamily="34" charset="0"/>
+              <a:buChar char="•"/>
+            </a:pPr>
+            <a:r>
+              <a:rPr lang="en-GB" sz="2400" dirty="0" smtClean="0"/>
+              <a:t>5-star </a:t>
+            </a:r>
+            <a:r>
+              <a:rPr lang="en-GB" sz="2400" dirty="0" smtClean="0"/>
+              <a:t>rating system</a:t>
+            </a:r>
+            <a:endParaRPr lang="en-GB" sz="2400" dirty="0" smtClean="0"/>
+          </a:p>
+          <a:p>
+            <a:pPr lvl="1">
+              <a:buFont typeface="Arial" panose="020B0604020202020204" pitchFamily="34" charset="0"/>
+              <a:buChar char="•"/>
+            </a:pPr>
+            <a:r>
+              <a:rPr lang="en-GB" sz="2400" dirty="0" smtClean="0"/>
+              <a:t>Optional text </a:t>
+            </a:r>
+            <a:r>
+              <a:rPr lang="en-GB" sz="2400" dirty="0" smtClean="0"/>
+              <a:t>review (carefully filtered)</a:t>
+            </a:r>
+            <a:endParaRPr lang="en-GB" sz="2400" dirty="0" smtClean="0"/>
           </a:p>
         </p:txBody>
       </p:sp>
@@ -10080,6 +10122,25 @@
           <a:chExt cx="0" cy="0"/>
         </a:xfrm>
       </p:grpSpPr>
+      <p:sp>
+        <p:nvSpPr>
+          <p:cNvPr id="2" name="Title 1"/>
+          <p:cNvSpPr>
+            <a:spLocks noGrp="1"/>
+          </p:cNvSpPr>
+          <p:nvPr>
+            <p:ph type="title"/>
+          </p:nvPr>
+        </p:nvSpPr>
+        <p:spPr/>
+        <p:txBody>
+          <a:bodyPr/>
+          <a:lstStyle/>
+          <a:p>
+            <a:endParaRPr lang="en-GB"/>
+          </a:p>
+        </p:txBody>
+      </p:sp>
       <p:pic>
         <p:nvPicPr>
           <p:cNvPr id="9" name="Picture Placeholder 8" descr="2a1c1d8.jpg"/>
@@ -10087,7 +10148,7 @@
             <a:picLocks noGrp="1" noChangeAspect="1"/>
           </p:cNvPicPr>
           <p:nvPr>
-            <p:ph idx="1"/>
+            <p:ph idx="4294967295"/>
           </p:nvPr>
         </p:nvPicPr>
         <p:blipFill>
@@ -10104,7 +10165,7 @@
         </p:blipFill>
         <p:spPr>
           <a:xfrm>
-            <a:off x="4479348" y="-336424"/>
+            <a:off x="7112000" y="-336550"/>
             <a:ext cx="5080000" cy="5080000"/>
           </a:xfrm>
         </p:spPr>
@@ -10116,13 +10177,13 @@
             <a:spLocks noGrp="1"/>
           </p:cNvSpPr>
           <p:nvPr>
-            <p:ph type="body" sz="half" idx="2"/>
+            <p:ph type="body" sz="half" idx="4294967295"/>
           </p:nvPr>
         </p:nvSpPr>
         <p:spPr>
           <a:xfrm>
-            <a:off x="454214" y="1049524"/>
-            <a:ext cx="3200400" cy="4781204"/>
+            <a:off x="665480" y="2520950"/>
+            <a:ext cx="6014720" cy="4781550"/>
           </a:xfrm>
         </p:spPr>
         <p:txBody>
@@ -10164,8 +10225,8 @@
         </p:blipFill>
         <p:spPr>
           <a:xfrm>
-            <a:off x="9370053" y="4545781"/>
-            <a:ext cx="2614229" cy="1944031"/>
+            <a:off x="9577388" y="4545013"/>
+            <a:ext cx="2614612" cy="1944687"/>
           </a:xfrm>
         </p:spPr>
       </p:pic>
@@ -10188,8 +10249,8 @@
         </p:blipFill>
         <p:spPr>
           <a:xfrm>
-            <a:off x="10017939" y="438267"/>
-            <a:ext cx="1966343" cy="3001859"/>
+            <a:off x="10226675" y="438150"/>
+            <a:ext cx="1965325" cy="3001963"/>
           </a:xfrm>
         </p:spPr>
       </p:pic>
@@ -10245,15 +10306,10 @@
             <a:spLocks noGrp="1"/>
           </p:cNvSpPr>
           <p:nvPr>
-            <p:ph type="title" idx="4294967295"/>
-          </p:nvPr>
-        </p:nvSpPr>
-        <p:spPr>
-          <a:xfrm>
-            <a:off x="1097280" y="1017163"/>
-            <a:ext cx="10058400" cy="720197"/>
-          </a:xfrm>
-        </p:spPr>
+            <p:ph type="title"/>
+          </p:nvPr>
+        </p:nvSpPr>
+        <p:spPr/>
         <p:txBody>
           <a:bodyPr>
             <a:spAutoFit/>
@@ -10262,7 +10318,7 @@
           <a:p>
             <a:pPr lvl="0"/>
             <a:r>
-              <a:rPr lang="en-GB"/>
+              <a:rPr lang="en-GB" dirty="0"/>
               <a:t>Connecting to Social networks</a:t>
             </a:r>
           </a:p>
@@ -10276,8 +10332,8 @@
         </p:nvSpPr>
         <p:spPr>
           <a:xfrm>
-            <a:off x="2437959" y="2155465"/>
-            <a:ext cx="8681257" cy="1259945"/>
+            <a:off x="917046" y="2085143"/>
+            <a:ext cx="10421797" cy="1585162"/>
           </a:xfrm>
           <a:prstGeom prst="rect">
             <a:avLst/>
@@ -10295,8 +10351,13 @@
           <a:p>
             <a:pPr hangingPunct="0"/>
             <a:r>
-              <a:rPr lang="en-GB" sz="1996">
-                <a:latin typeface="Liberation Sans" pitchFamily="18"/>
+              <a:rPr lang="en-GB" sz="2400" dirty="0">
+                <a:solidFill>
+                  <a:schemeClr val="tx1">
+                    <a:lumMod val="75000"/>
+                    <a:lumOff val="25000"/>
+                  </a:schemeClr>
+                </a:solidFill>
                 <a:ea typeface="DejaVu Sans" pitchFamily="2"/>
                 <a:cs typeface="DejaVu Sans" pitchFamily="2"/>
               </a:rPr>
@@ -10304,29 +10365,55 @@
             </a:r>
           </a:p>
           <a:p>
-            <a:pPr hangingPunct="0">
-              <a:buSzPct val="45000"/>
-              <a:buFont typeface="StarSymbol"/>
-              <a:buChar char="●"/>
+            <a:pPr marL="342900" indent="-342900" hangingPunct="0">
+              <a:buClr>
+                <a:schemeClr val="accent1"/>
+              </a:buClr>
+              <a:buSzPct val="100000"/>
+              <a:buFont typeface="Arial" panose="020B0604020202020204" pitchFamily="34" charset="0"/>
+              <a:buChar char="•"/>
             </a:pPr>
             <a:r>
-              <a:rPr lang="en-GB" sz="1996">
-                <a:latin typeface="Liberation Sans" pitchFamily="18"/>
+              <a:rPr lang="en-GB" sz="2400" dirty="0" smtClean="0">
+                <a:solidFill>
+                  <a:schemeClr val="tx1">
+                    <a:lumMod val="75000"/>
+                    <a:lumOff val="25000"/>
+                  </a:schemeClr>
+                </a:solidFill>
                 <a:ea typeface="DejaVu Sans" pitchFamily="2"/>
                 <a:cs typeface="DejaVu Sans" pitchFamily="2"/>
               </a:rPr>
               <a:t>Facebook</a:t>
             </a:r>
-          </a:p>
-          <a:p>
-            <a:pPr hangingPunct="0">
-              <a:buSzPct val="45000"/>
-              <a:buFont typeface="StarSymbol"/>
-              <a:buChar char="●"/>
+            <a:endParaRPr lang="en-GB" sz="2400" dirty="0">
+              <a:solidFill>
+                <a:schemeClr val="tx1">
+                  <a:lumMod val="75000"/>
+                  <a:lumOff val="25000"/>
+                </a:schemeClr>
+              </a:solidFill>
+              <a:ea typeface="DejaVu Sans" pitchFamily="2"/>
+              <a:cs typeface="DejaVu Sans" pitchFamily="2"/>
+            </a:endParaRPr>
+          </a:p>
+          <a:p>
+            <a:pPr marL="342900" indent="-342900" hangingPunct="0">
+              <a:buClr>
+                <a:schemeClr val="accent1"/>
+              </a:buClr>
+              <a:buSzPct val="100000"/>
+              <a:buFont typeface="Arial" panose="020B0604020202020204" pitchFamily="34" charset="0"/>
+              <a:buChar char="•"/>
             </a:pPr>
             <a:r>
-              <a:rPr lang="en-GB" sz="1996">
-                <a:latin typeface="Liberation Sans" pitchFamily="18"/>
+              <a:rPr lang="en-GB" sz="2400" dirty="0">
+                <a:solidFill>
+                  <a:schemeClr val="tx1">
+                    <a:lumMod val="75000"/>
+                    <a:lumOff val="25000"/>
+                  </a:schemeClr>
+                </a:solidFill>
                 <a:ea typeface="DejaVu Sans" pitchFamily="2"/>
                 <a:cs typeface="DejaVu Sans" pitchFamily="2"/>
               </a:rPr>
@@ -10334,14 +10421,22 @@
             </a:r>
           </a:p>
           <a:p>
-            <a:pPr hangingPunct="0">
-              <a:buSzPct val="45000"/>
-              <a:buFont typeface="StarSymbol"/>
-              <a:buChar char="●"/>
+            <a:pPr marL="342900" indent="-342900" hangingPunct="0">
+              <a:buClr>
+                <a:schemeClr val="accent1"/>
+              </a:buClr>
+              <a:buSzPct val="100000"/>
+              <a:buFont typeface="Arial" panose="020B0604020202020204" pitchFamily="34" charset="0"/>
+              <a:buChar char="•"/>
             </a:pPr>
             <a:r>
-              <a:rPr lang="en-GB" sz="1996">
-                <a:latin typeface="Liberation Sans" pitchFamily="18"/>
+              <a:rPr lang="en-GB" sz="2400" dirty="0">
+                <a:solidFill>
+                  <a:schemeClr val="tx1">
+                    <a:lumMod val="75000"/>
+                    <a:lumOff val="25000"/>
+                  </a:schemeClr>
+                </a:solidFill>
                 <a:ea typeface="DejaVu Sans" pitchFamily="2"/>
                 <a:cs typeface="DejaVu Sans" pitchFamily="2"/>
               </a:rPr>
@@ -10370,8 +10465,8 @@
         </p:blipFill>
         <p:spPr>
           <a:xfrm>
-            <a:off x="7075474" y="1828878"/>
-            <a:ext cx="1668851" cy="1567610"/>
+            <a:off x="9771233" y="4023885"/>
+            <a:ext cx="1567610" cy="1442773"/>
           </a:xfrm>
           <a:prstGeom prst="rect">
             <a:avLst/>
@@ -10402,7 +10497,7 @@
         </p:blipFill>
         <p:spPr>
           <a:xfrm>
-            <a:off x="8055230" y="3527124"/>
+            <a:off x="5277358" y="2951891"/>
             <a:ext cx="1698244" cy="1502292"/>
           </a:xfrm>
           <a:prstGeom prst="rect">
@@ -10434,7 +10529,7 @@
         </p:blipFill>
         <p:spPr>
           <a:xfrm>
-            <a:off x="6095717" y="3527124"/>
+            <a:off x="914117" y="4029682"/>
             <a:ext cx="1567610" cy="1436976"/>
           </a:xfrm>
           <a:prstGeom prst="rect">
@@ -10498,41 +10593,36 @@
             <a:spLocks noGrp="1"/>
           </p:cNvSpPr>
           <p:nvPr>
-            <p:ph type="title" idx="4294967295"/>
+            <p:ph type="title"/>
+          </p:nvPr>
+        </p:nvSpPr>
+        <p:spPr/>
+        <p:txBody>
+          <a:bodyPr/>
+          <a:lstStyle/>
+          <a:p>
+            <a:pPr lvl="0"/>
+            <a:r>
+              <a:rPr lang="en-GB" dirty="0"/>
+              <a:t>Get to know each other</a:t>
+            </a:r>
+          </a:p>
+        </p:txBody>
+      </p:sp>
+      <p:sp>
+        <p:nvSpPr>
+          <p:cNvPr id="3" name="Text Placeholder 2"/>
+          <p:cNvSpPr txBox="1">
+            <a:spLocks noGrp="1"/>
+          </p:cNvSpPr>
+          <p:nvPr>
+            <p:ph type="subTitle" idx="4294967295"/>
           </p:nvPr>
         </p:nvSpPr>
         <p:spPr>
           <a:xfrm>
-            <a:off x="1097280" y="286603"/>
-            <a:ext cx="10058400" cy="1491397"/>
-          </a:xfrm>
-        </p:spPr>
-        <p:txBody>
-          <a:bodyPr/>
-          <a:lstStyle/>
-          <a:p>
-            <a:pPr lvl="0"/>
-            <a:r>
-              <a:rPr lang="en-GB" dirty="0"/>
-              <a:t>Get to know each other</a:t>
-            </a:r>
-          </a:p>
-        </p:txBody>
-      </p:sp>
-      <p:sp>
-        <p:nvSpPr>
-          <p:cNvPr id="3" name="Text Placeholder 2"/>
-          <p:cNvSpPr txBox="1">
-            <a:spLocks noGrp="1"/>
-          </p:cNvSpPr>
-          <p:nvPr>
-            <p:ph type="body" idx="4294967295"/>
-          </p:nvPr>
-        </p:nvSpPr>
-        <p:spPr>
-          <a:xfrm>
-            <a:off x="1097280" y="2036641"/>
-            <a:ext cx="10058400" cy="3830759"/>
+            <a:off x="1097280" y="2246313"/>
+            <a:ext cx="10058400" cy="1143000"/>
           </a:xfrm>
         </p:spPr>
         <p:txBody>
@@ -10541,10 +10631,9 @@
           </a:bodyPr>
           <a:lstStyle/>
           <a:p>
-            <a:pPr lvl="0">
-              <a:buSzPct val="45000"/>
-              <a:buFont typeface="StarSymbol"/>
-              <a:buChar char="●"/>
+            <a:pPr lvl="1">
+              <a:buFont typeface="Arial" panose="020B0604020202020204" pitchFamily="34" charset="0"/>
+              <a:buChar char="•"/>
             </a:pPr>
             <a:r>
               <a:rPr lang="en-GB" sz="2400" dirty="0"/>
@@ -10552,10 +10641,9 @@
             </a:r>
           </a:p>
           <a:p>
-            <a:pPr lvl="0">
-              <a:buSzPct val="45000"/>
-              <a:buFont typeface="StarSymbol"/>
-              <a:buChar char="●"/>
+            <a:pPr lvl="1">
+              <a:buFont typeface="Arial" panose="020B0604020202020204" pitchFamily="34" charset="0"/>
+              <a:buChar char="•"/>
             </a:pPr>
             <a:r>
               <a:rPr lang="en-GB" sz="2400" dirty="0"/>
@@ -10616,7 +10704,7 @@
             <a:spLocks noGrp="1"/>
           </p:cNvSpPr>
           <p:nvPr>
-            <p:ph type="title" idx="4294967295"/>
+            <p:ph type="title"/>
           </p:nvPr>
         </p:nvSpPr>
         <p:spPr/>
@@ -10644,8 +10732,8 @@
         </p:nvSpPr>
         <p:spPr>
           <a:xfrm>
-            <a:off x="1097280" y="2095499"/>
-            <a:ext cx="10058399" cy="3946589"/>
+            <a:off x="1097280" y="2235200"/>
+            <a:ext cx="10058400" cy="3946525"/>
           </a:xfrm>
         </p:spPr>
         <p:txBody>
@@ -10654,10 +10742,9 @@
           </a:bodyPr>
           <a:lstStyle/>
           <a:p>
-            <a:pPr lvl="0">
-              <a:buSzPct val="45000"/>
-              <a:buFont typeface="StarSymbol"/>
-              <a:buChar char="●"/>
+            <a:pPr lvl="1">
+              <a:buFont typeface="Arial" panose="020B0604020202020204" pitchFamily="34" charset="0"/>
+              <a:buChar char="•"/>
             </a:pPr>
             <a:r>
               <a:rPr lang="en-GB" sz="2400" dirty="0"/>
@@ -10665,10 +10752,9 @@
             </a:r>
           </a:p>
           <a:p>
-            <a:pPr lvl="0">
-              <a:buSzPct val="45000"/>
-              <a:buFont typeface="StarSymbol"/>
-              <a:buChar char="●"/>
+            <a:pPr lvl="1">
+              <a:buFont typeface="Arial" panose="020B0604020202020204" pitchFamily="34" charset="0"/>
+              <a:buChar char="•"/>
             </a:pPr>
             <a:r>
               <a:rPr lang="en-GB" sz="2400" dirty="0"/>
@@ -10729,7 +10815,7 @@
             <a:spLocks noGrp="1"/>
           </p:cNvSpPr>
           <p:nvPr>
-            <p:ph type="title" idx="4294967295"/>
+            <p:ph type="title"/>
           </p:nvPr>
         </p:nvSpPr>
         <p:spPr/>
@@ -10757,8 +10843,8 @@
         </p:nvSpPr>
         <p:spPr>
           <a:xfrm>
-            <a:off x="1097280" y="2082800"/>
-            <a:ext cx="10058400" cy="3786294"/>
+            <a:off x="1097280" y="2095500"/>
+            <a:ext cx="10345420" cy="3786188"/>
           </a:xfrm>
         </p:spPr>
         <p:txBody>
@@ -10767,37 +10853,60 @@
           </a:bodyPr>
           <a:lstStyle/>
           <a:p>
-            <a:pPr lvl="0">
-              <a:buSzPct val="45000"/>
-              <a:buFont typeface="StarSymbol"/>
-              <a:buChar char="●"/>
+            <a:pPr lvl="1">
+              <a:buFont typeface="Arial" panose="020B0604020202020204" pitchFamily="34" charset="0"/>
+              <a:buChar char="•"/>
             </a:pPr>
             <a:r>
               <a:rPr lang="en-GB" sz="2400" dirty="0"/>
-              <a:t>We plan on implementing a chat system into the Roomies website</a:t>
-            </a:r>
-          </a:p>
-          <a:p>
-            <a:pPr lvl="0">
-              <a:buSzPct val="45000"/>
-              <a:buFont typeface="StarSymbol"/>
-              <a:buChar char="●"/>
+              <a:t>We plan on implementing </a:t>
+            </a:r>
+            <a:r>
+              <a:rPr lang="en-GB" sz="2400" dirty="0" smtClean="0"/>
+              <a:t>a built-in instant messaging system</a:t>
+            </a:r>
+          </a:p>
+          <a:p>
+            <a:pPr lvl="1">
+              <a:buFont typeface="Arial" panose="020B0604020202020204" pitchFamily="34" charset="0"/>
+              <a:buChar char="•"/>
             </a:pPr>
             <a:r>
+              <a:rPr lang="en-GB" sz="2400" dirty="0" smtClean="0"/>
+              <a:t>Remove </a:t>
+            </a:r>
+            <a:r>
               <a:rPr lang="en-GB" sz="2400" dirty="0"/>
-              <a:t>Remove the need to use alternate websites such as Facebook to communicate</a:t>
-            </a:r>
-          </a:p>
-          <a:p>
-            <a:pPr lvl="0">
-              <a:buSzPct val="45000"/>
-              <a:buFont typeface="StarSymbol"/>
-              <a:buChar char="●"/>
+              <a:t>the need to use alternate websites such as Facebook to </a:t>
+            </a:r>
+            <a:r>
+              <a:rPr lang="en-GB" sz="2400" dirty="0" smtClean="0"/>
+              <a:t>communicate</a:t>
+            </a:r>
+            <a:endParaRPr lang="en-GB" sz="2400" dirty="0"/>
+          </a:p>
+          <a:p>
+            <a:pPr lvl="1">
+              <a:buFont typeface="Arial" panose="020B0604020202020204" pitchFamily="34" charset="0"/>
+              <a:buChar char="•"/>
             </a:pPr>
             <a:r>
               <a:rPr lang="en-GB" sz="2400" dirty="0"/>
-              <a:t>Allow users to communicate with the students they are matched with instantly</a:t>
-            </a:r>
+              <a:t>Allow users to </a:t>
+            </a:r>
+            <a:r>
+              <a:rPr lang="en-GB" sz="2400" dirty="0" smtClean="0"/>
+              <a:t>communicate better </a:t>
+            </a:r>
+            <a:r>
+              <a:rPr lang="en-GB" sz="2400" dirty="0"/>
+              <a:t>with the students they are matched </a:t>
+            </a:r>
+            <a:r>
+              <a:rPr lang="en-GB" sz="2400" dirty="0" smtClean="0"/>
+              <a:t>with</a:t>
+            </a:r>
+            <a:endParaRPr lang="en-GB" sz="2400" dirty="0"/>
           </a:p>
         </p:txBody>
       </p:sp>
@@ -10853,7 +10962,7 @@
             <a:spLocks noGrp="1"/>
           </p:cNvSpPr>
           <p:nvPr>
-            <p:ph type="title" idx="4294967295"/>
+            <p:ph type="title"/>
           </p:nvPr>
         </p:nvSpPr>
         <p:spPr/>
@@ -10881,8 +10990,8 @@
         </p:nvSpPr>
         <p:spPr>
           <a:xfrm>
-            <a:off x="1097280" y="2235200"/>
-            <a:ext cx="10058400" cy="3633894"/>
+            <a:off x="1097280" y="2171700"/>
+            <a:ext cx="10058400" cy="3633788"/>
           </a:xfrm>
         </p:spPr>
         <p:txBody>
@@ -10891,10 +11000,9 @@
           </a:bodyPr>
           <a:lstStyle/>
           <a:p>
-            <a:pPr lvl="0">
-              <a:buSzPct val="45000"/>
-              <a:buFont typeface="StarSymbol"/>
-              <a:buChar char="●"/>
+            <a:pPr lvl="1">
+              <a:buFont typeface="Arial" panose="020B0604020202020204" pitchFamily="34" charset="0"/>
+              <a:buChar char="•"/>
             </a:pPr>
             <a:r>
               <a:rPr lang="en-GB" sz="2400" dirty="0"/>
@@ -10910,22 +11018,18 @@
             </a:r>
           </a:p>
           <a:p>
-            <a:pPr lvl="0">
-              <a:buSzPct val="45000"/>
-              <a:buFont typeface="StarSymbol"/>
-              <a:buChar char="●"/>
+            <a:pPr lvl="1">
+              <a:buFont typeface="Arial" panose="020B0604020202020204" pitchFamily="34" charset="0"/>
+              <a:buChar char="•"/>
             </a:pPr>
             <a:r>
               <a:rPr lang="en-GB" sz="2400" dirty="0"/>
-              <a:t>Improve the chances of communication between roommates.</a:t>
-            </a:r>
-          </a:p>
-          <a:p>
-            <a:pPr lvl="0">
-              <a:buSzPct val="45000"/>
-              <a:buFont typeface="StarSymbol"/>
-              <a:buChar char="●"/>
-            </a:pPr>
+              <a:t>Improve the chances of communication between </a:t>
+            </a:r>
+            <a:r>
+              <a:rPr lang="en-GB" sz="2400" dirty="0" smtClean="0"/>
+              <a:t>roommates</a:t>
+            </a:r>
             <a:endParaRPr lang="en-GB" sz="2400" dirty="0"/>
           </a:p>
         </p:txBody>
@@ -10982,7 +11086,7 @@
             <a:spLocks noGrp="1"/>
           </p:cNvSpPr>
           <p:nvPr>
-            <p:ph type="title" idx="4294967295"/>
+            <p:ph type="title"/>
           </p:nvPr>
         </p:nvSpPr>
         <p:spPr/>
@@ -11010,23 +11114,43 @@
         </p:nvSpPr>
         <p:spPr>
           <a:xfrm>
-            <a:off x="1097280" y="2159000"/>
-            <a:ext cx="10058400" cy="3710094"/>
+            <a:off x="1097280" y="2146300"/>
+            <a:ext cx="10058400" cy="3709988"/>
           </a:xfrm>
         </p:spPr>
         <p:txBody>
           <a:bodyPr/>
           <a:lstStyle/>
           <a:p>
-            <a:pPr lvl="0">
-              <a:buSzPct val="45000"/>
-              <a:buFont typeface="StarSymbol"/>
-              <a:buChar char="●"/>
+            <a:pPr lvl="1">
+              <a:buSzPct val="100000"/>
+              <a:buFont typeface="Arial" panose="020B0604020202020204" pitchFamily="34" charset="0"/>
+              <a:buChar char="•"/>
             </a:pPr>
             <a:r>
+              <a:rPr lang="en-GB" sz="2400" dirty="0" smtClean="0"/>
+              <a:t>Facebook </a:t>
+            </a:r>
+            <a:r>
               <a:rPr lang="en-GB" sz="2400" dirty="0"/>
-              <a:t>Including Facebook comments for the student accommodation reviews</a:t>
-            </a:r>
+              <a:t>comments for the student accommodation </a:t>
+            </a:r>
+            <a:r>
+              <a:rPr lang="en-GB" sz="2400" dirty="0" smtClean="0"/>
+              <a:t>reviews</a:t>
+            </a:r>
+          </a:p>
+          <a:p>
+            <a:pPr lvl="1">
+              <a:buSzPct val="100000"/>
+              <a:buFont typeface="Arial" panose="020B0604020202020204" pitchFamily="34" charset="0"/>
+              <a:buChar char="•"/>
+            </a:pPr>
+            <a:r>
+              <a:rPr lang="en-GB" sz="2400" dirty="0" smtClean="0"/>
+              <a:t>Built-in review system for those not connected with Facebook</a:t>
+            </a:r>
+            <a:endParaRPr lang="en-GB" sz="2400" dirty="0"/>
           </a:p>
           <a:p>
             <a:pPr marL="0" lvl="0" indent="0">
@@ -11082,70 +11206,46 @@
           <a:chExt cx="0" cy="0"/>
         </a:xfrm>
       </p:grpSpPr>
-      <p:sp>
-        <p:nvSpPr>
-          <p:cNvPr id="3" name="Content Placeholder 2"/>
-          <p:cNvSpPr>
-            <a:spLocks noGrp="1"/>
-          </p:cNvSpPr>
-          <p:nvPr>
-            <p:ph idx="1"/>
-          </p:nvPr>
-        </p:nvSpPr>
-        <p:spPr/>
-        <p:txBody>
-          <a:bodyPr/>
-          <a:lstStyle/>
-          <a:p>
-            <a:endParaRPr lang="en-GB"/>
-          </a:p>
-        </p:txBody>
-      </p:sp>
-      <p:sp>
-        <p:nvSpPr>
-          <p:cNvPr id="4" name="Text Placeholder 3"/>
-          <p:cNvSpPr>
-            <a:spLocks noGrp="1"/>
-          </p:cNvSpPr>
-          <p:nvPr>
-            <p:ph type="body" sz="half" idx="2"/>
-          </p:nvPr>
-        </p:nvSpPr>
+      <p:pic>
+        <p:nvPicPr>
+          <p:cNvPr id="3" name="Picture 2"/>
+          <p:cNvPicPr>
+            <a:picLocks noChangeAspect="1"/>
+          </p:cNvPicPr>
+          <p:nvPr/>
+        </p:nvPicPr>
+        <p:blipFill>
+          <a:blip r:embed="rId2">
+            <a:extLst>
+              <a:ext uri="{28A0092B-C50C-407E-A947-70E740481C1C}">
+                <a14:useLocalDpi xmlns:a14="http://schemas.microsoft.com/office/drawing/2010/main" val="0"/>
+              </a:ext>
+            </a:extLst>
+          </a:blip>
+          <a:stretch>
+            <a:fillRect/>
+          </a:stretch>
+        </p:blipFill>
         <p:spPr>
           <a:xfrm>
-            <a:off x="360095" y="1477605"/>
-            <a:ext cx="3200400" cy="3379124"/>
+            <a:off x="0" y="0"/>
+            <a:ext cx="12192000" cy="6123054"/>
           </a:xfrm>
+          <a:prstGeom prst="rect">
+            <a:avLst/>
+          </a:prstGeom>
         </p:spPr>
-        <p:txBody>
-          <a:bodyPr/>
-          <a:lstStyle/>
-          <a:p>
-            <a:pPr marL="285750" indent="-285750">
-              <a:buFont typeface="Arial" panose="020B0604020202020204" pitchFamily="34" charset="0"/>
-              <a:buChar char="•"/>
-            </a:pPr>
-            <a:endParaRPr lang="en-GB" dirty="0"/>
-          </a:p>
-        </p:txBody>
-      </p:sp>
+      </p:pic>
     </p:spTree>
     <p:extLst>
       <p:ext uri="{BB962C8B-B14F-4D97-AF65-F5344CB8AC3E}">
-        <p14:creationId xmlns:p14="http://schemas.microsoft.com/office/powerpoint/2010/main" val="1306114995"/>
+        <p14:creationId xmlns:p14="http://schemas.microsoft.com/office/powerpoint/2010/main" val="2051924811"/>
       </p:ext>
     </p:extLst>
   </p:cSld>
   <p:clrMapOvr>
     <a:masterClrMapping/>
   </p:clrMapOvr>
-  <p:timing>
-    <p:tnLst>
-      <p:par>
-        <p:cTn id="1" dur="indefinite" restart="never" nodeType="tmRoot"/>
-      </p:par>
-    </p:tnLst>
-  </p:timing>
 </p:sld>
 </file>
 
@@ -11168,14 +11268,37 @@
       </p:grpSpPr>
       <p:sp>
         <p:nvSpPr>
-          <p:cNvPr id="2" name="TextBox 1"/>
+          <p:cNvPr id="4" name="Title 3"/>
+          <p:cNvSpPr>
+            <a:spLocks noGrp="1"/>
+          </p:cNvSpPr>
+          <p:nvPr>
+            <p:ph type="title"/>
+          </p:nvPr>
+        </p:nvSpPr>
+        <p:spPr/>
+        <p:txBody>
+          <a:bodyPr/>
+          <a:lstStyle/>
+          <a:p>
+            <a:r>
+              <a:rPr lang="en-GB" dirty="0" smtClean="0"/>
+              <a:t>Technical Stuff</a:t>
+            </a:r>
+            <a:endParaRPr lang="en-GB" dirty="0"/>
+          </a:p>
+        </p:txBody>
+      </p:sp>
+      <p:sp>
+        <p:nvSpPr>
+          <p:cNvPr id="3" name="TextBox 2"/>
           <p:cNvSpPr txBox="1"/>
           <p:nvPr/>
         </p:nvSpPr>
         <p:spPr>
           <a:xfrm>
-            <a:off x="2860766" y="587829"/>
-            <a:ext cx="5773783" cy="707886"/>
+            <a:off x="1541417" y="2050869"/>
+            <a:ext cx="8491107" cy="2308324"/>
           </a:xfrm>
           <a:prstGeom prst="rect">
             <a:avLst/>
@@ -11183,87 +11306,226 @@
           <a:noFill/>
         </p:spPr>
         <p:txBody>
-          <a:bodyPr wrap="square" rtlCol="0">
-            <a:spAutoFit/>
-          </a:bodyPr>
-          <a:lstStyle/>
-          <a:p>
-            <a:pPr algn="ctr"/>
-            <a:r>
-              <a:rPr lang="en-GB" sz="4000" dirty="0" smtClean="0"/>
-              <a:t>Technical stuff</a:t>
-            </a:r>
-            <a:endParaRPr lang="en-GB" sz="4000" dirty="0"/>
-          </a:p>
-        </p:txBody>
-      </p:sp>
-      <p:sp>
-        <p:nvSpPr>
-          <p:cNvPr id="3" name="TextBox 2"/>
-          <p:cNvSpPr txBox="1"/>
-          <p:nvPr/>
-        </p:nvSpPr>
-        <p:spPr>
-          <a:xfrm>
-            <a:off x="1541417" y="2050869"/>
-            <a:ext cx="7890622" cy="1938992"/>
-          </a:xfrm>
-          <a:prstGeom prst="rect">
-            <a:avLst/>
-          </a:prstGeom>
-          <a:noFill/>
-        </p:spPr>
-        <p:txBody>
           <a:bodyPr wrap="none" rtlCol="0">
             <a:spAutoFit/>
           </a:bodyPr>
           <a:lstStyle/>
           <a:p>
             <a:pPr marL="285750" indent="-285750">
+              <a:buClr>
+                <a:schemeClr val="accent1"/>
+              </a:buClr>
               <a:buFont typeface="Arial" panose="020B0604020202020204" pitchFamily="34" charset="0"/>
               <a:buChar char="•"/>
             </a:pPr>
             <a:r>
-              <a:rPr lang="en-GB" sz="2400" dirty="0" smtClean="0"/>
+              <a:rPr lang="en-GB" sz="2400" dirty="0" smtClean="0">
+                <a:solidFill>
+                  <a:schemeClr val="tx1">
+                    <a:lumMod val="75000"/>
+                    <a:lumOff val="25000"/>
+                  </a:schemeClr>
+                </a:solidFill>
+              </a:rPr>
               <a:t>HTML and CSS for building the webpages (duh)</a:t>
             </a:r>
           </a:p>
           <a:p>
             <a:pPr marL="285750" indent="-285750">
+              <a:buClr>
+                <a:schemeClr val="accent1"/>
+              </a:buClr>
               <a:buFont typeface="Arial" panose="020B0604020202020204" pitchFamily="34" charset="0"/>
               <a:buChar char="•"/>
             </a:pPr>
             <a:r>
-              <a:rPr lang="en-GB" sz="2400" dirty="0" smtClean="0"/>
-              <a:t>MYSQL – a perfect relational database management system</a:t>
+              <a:rPr lang="en-GB" sz="2400" dirty="0" smtClean="0">
+                <a:solidFill>
+                  <a:schemeClr val="tx1">
+                    <a:lumMod val="75000"/>
+                    <a:lumOff val="25000"/>
+                  </a:schemeClr>
+                </a:solidFill>
+              </a:rPr>
+              <a:t>MYSQL </a:t>
+            </a:r>
+            <a:r>
+              <a:rPr lang="en-GB" sz="2400" dirty="0" smtClean="0">
+                <a:solidFill>
+                  <a:schemeClr val="tx1">
+                    <a:lumMod val="75000"/>
+                    <a:lumOff val="25000"/>
+                  </a:schemeClr>
+                </a:solidFill>
+              </a:rPr>
+              <a:t>		– </a:t>
+            </a:r>
+            <a:r>
+              <a:rPr lang="en-GB" sz="2400" dirty="0" smtClean="0">
+                <a:solidFill>
+                  <a:schemeClr val="tx1">
+                    <a:lumMod val="75000"/>
+                    <a:lumOff val="25000"/>
+                  </a:schemeClr>
+                </a:solidFill>
+              </a:rPr>
+              <a:t>a perfect relational database management system</a:t>
             </a:r>
           </a:p>
           <a:p>
             <a:pPr marL="285750" indent="-285750">
+              <a:buClr>
+                <a:schemeClr val="accent1"/>
+              </a:buClr>
               <a:buFont typeface="Arial" panose="020B0604020202020204" pitchFamily="34" charset="0"/>
               <a:buChar char="•"/>
             </a:pPr>
             <a:r>
-              <a:rPr lang="en-GB" sz="2400" dirty="0" smtClean="0"/>
-              <a:t>PHP – great for server-side processing</a:t>
+              <a:rPr lang="en-GB" sz="2400" dirty="0" smtClean="0">
+                <a:solidFill>
+                  <a:schemeClr val="tx1">
+                    <a:lumMod val="75000"/>
+                    <a:lumOff val="25000"/>
+                  </a:schemeClr>
+                </a:solidFill>
+              </a:rPr>
+              <a:t>PHP </a:t>
+            </a:r>
+            <a:r>
+              <a:rPr lang="en-GB" sz="2400" dirty="0">
+                <a:solidFill>
+                  <a:schemeClr val="tx1">
+                    <a:lumMod val="75000"/>
+                    <a:lumOff val="25000"/>
+                  </a:schemeClr>
+                </a:solidFill>
+              </a:rPr>
+              <a:t>	</a:t>
+            </a:r>
+            <a:r>
+              <a:rPr lang="en-GB" sz="2400" dirty="0" smtClean="0">
+                <a:solidFill>
+                  <a:schemeClr val="tx1">
+                    <a:lumMod val="75000"/>
+                    <a:lumOff val="25000"/>
+                  </a:schemeClr>
+                </a:solidFill>
+              </a:rPr>
+              <a:t>		</a:t>
+            </a:r>
+            <a:r>
+              <a:rPr lang="en-GB" sz="2400" dirty="0" smtClean="0">
+                <a:solidFill>
+                  <a:schemeClr val="tx1">
+                    <a:lumMod val="75000"/>
+                    <a:lumOff val="25000"/>
+                  </a:schemeClr>
+                </a:solidFill>
+              </a:rPr>
+              <a:t>– </a:t>
+            </a:r>
+            <a:r>
+              <a:rPr lang="en-GB" sz="2400" dirty="0" smtClean="0">
+                <a:solidFill>
+                  <a:schemeClr val="tx1">
+                    <a:lumMod val="75000"/>
+                    <a:lumOff val="25000"/>
+                  </a:schemeClr>
+                </a:solidFill>
+              </a:rPr>
+              <a:t>great for server-side processing</a:t>
             </a:r>
           </a:p>
           <a:p>
             <a:pPr marL="285750" indent="-285750">
+              <a:buClr>
+                <a:schemeClr val="accent1"/>
+              </a:buClr>
               <a:buFont typeface="Arial" panose="020B0604020202020204" pitchFamily="34" charset="0"/>
               <a:buChar char="•"/>
             </a:pPr>
             <a:r>
-              <a:rPr lang="en-GB" sz="2400" dirty="0" smtClean="0"/>
-              <a:t>PYTHON – useful for real-time server communications</a:t>
+              <a:rPr lang="en-GB" sz="2400" dirty="0" smtClean="0">
+                <a:solidFill>
+                  <a:schemeClr val="tx1">
+                    <a:lumMod val="75000"/>
+                    <a:lumOff val="25000"/>
+                  </a:schemeClr>
+                </a:solidFill>
+              </a:rPr>
+              <a:t>PYTHON </a:t>
+            </a:r>
+            <a:r>
+              <a:rPr lang="en-GB" sz="2400" dirty="0" smtClean="0">
+                <a:solidFill>
+                  <a:schemeClr val="tx1">
+                    <a:lumMod val="75000"/>
+                    <a:lumOff val="25000"/>
+                  </a:schemeClr>
+                </a:solidFill>
+              </a:rPr>
+              <a:t>	– </a:t>
+            </a:r>
+            <a:r>
+              <a:rPr lang="en-GB" sz="2400" dirty="0" smtClean="0">
+                <a:solidFill>
+                  <a:schemeClr val="tx1">
+                    <a:lumMod val="75000"/>
+                    <a:lumOff val="25000"/>
+                  </a:schemeClr>
+                </a:solidFill>
+              </a:rPr>
+              <a:t>useful for real-time server </a:t>
+            </a:r>
+            <a:r>
+              <a:rPr lang="en-GB" sz="2400" dirty="0" smtClean="0">
+                <a:solidFill>
+                  <a:schemeClr val="tx1">
+                    <a:lumMod val="75000"/>
+                    <a:lumOff val="25000"/>
+                  </a:schemeClr>
+                </a:solidFill>
+              </a:rPr>
+              <a:t>communications</a:t>
             </a:r>
           </a:p>
           <a:p>
             <a:pPr marL="285750" indent="-285750">
+              <a:buClr>
+                <a:schemeClr val="accent1"/>
+              </a:buClr>
               <a:buFont typeface="Arial" panose="020B0604020202020204" pitchFamily="34" charset="0"/>
               <a:buChar char="•"/>
             </a:pPr>
-            <a:endParaRPr lang="en-GB" sz="2400" dirty="0"/>
+            <a:r>
+              <a:rPr lang="en-GB" sz="2400" dirty="0" smtClean="0">
+                <a:solidFill>
+                  <a:schemeClr val="tx1">
+                    <a:lumMod val="75000"/>
+                    <a:lumOff val="25000"/>
+                  </a:schemeClr>
+                </a:solidFill>
+              </a:rPr>
+              <a:t>JAVASCRIPT	– makes things more dynamic</a:t>
+            </a:r>
+            <a:endParaRPr lang="en-GB" sz="2400" dirty="0" smtClean="0">
+              <a:solidFill>
+                <a:schemeClr val="tx1">
+                  <a:lumMod val="75000"/>
+                  <a:lumOff val="25000"/>
+                </a:schemeClr>
+              </a:solidFill>
+            </a:endParaRPr>
+          </a:p>
+          <a:p>
+            <a:endParaRPr lang="en-GB" sz="2400" dirty="0">
+              <a:solidFill>
+                <a:schemeClr val="tx1">
+                  <a:lumMod val="75000"/>
+                  <a:lumOff val="25000"/>
+                </a:schemeClr>
+              </a:solidFill>
+            </a:endParaRPr>
           </a:p>
         </p:txBody>
       </p:sp>
@@ -11350,11 +11612,7 @@
             </a:pPr>
             <a:r>
               <a:rPr lang="en-GB" sz="2400" dirty="0" smtClean="0"/>
-              <a:t> People </a:t>
-            </a:r>
-            <a:r>
-              <a:rPr lang="en-GB" sz="2400" dirty="0" smtClean="0"/>
-              <a:t>need to find room-mates.</a:t>
+              <a:t> People need to find room-mates.</a:t>
             </a:r>
           </a:p>
           <a:p>
@@ -11382,11 +11640,7 @@
             </a:pPr>
             <a:r>
               <a:rPr lang="en-GB" sz="2400" dirty="0" smtClean="0"/>
-              <a:t> We </a:t>
-            </a:r>
-            <a:r>
-              <a:rPr lang="en-GB" sz="2400" dirty="0" smtClean="0"/>
-              <a:t>help them do that.</a:t>
+              <a:t> We help them do that.</a:t>
             </a:r>
           </a:p>
           <a:p>
@@ -11398,7 +11652,6 @@
               <a:rPr lang="en-GB" sz="2400" dirty="0" smtClean="0"/>
               <a:t> ???</a:t>
             </a:r>
-            <a:endParaRPr lang="en-GB" sz="2400" dirty="0" smtClean="0"/>
           </a:p>
           <a:p>
             <a:pPr marL="514350" indent="-514350">
@@ -11411,11 +11664,7 @@
             </a:r>
             <a:r>
               <a:rPr lang="en-GB" sz="2400" strike="sngStrike" dirty="0" smtClean="0"/>
-              <a:t>Profit</a:t>
-            </a:r>
-            <a:r>
-              <a:rPr lang="en-GB" sz="2400" strike="sngStrike" dirty="0" smtClean="0"/>
-              <a:t>.</a:t>
+              <a:t>Profit.</a:t>
             </a:r>
             <a:r>
               <a:rPr lang="en-GB" sz="2400" dirty="0" smtClean="0"/>
@@ -11434,19 +11683,7 @@
             </a:pPr>
             <a:r>
               <a:rPr lang="en-GB" sz="2400" i="1" dirty="0" smtClean="0"/>
-              <a:t>Ideally aimed </a:t>
-            </a:r>
-            <a:r>
-              <a:rPr lang="en-GB" sz="2400" i="1" dirty="0" smtClean="0"/>
-              <a:t>at </a:t>
-            </a:r>
-            <a:r>
-              <a:rPr lang="en-GB" sz="2400" i="1" dirty="0" smtClean="0"/>
-              <a:t>university </a:t>
-            </a:r>
-            <a:r>
-              <a:rPr lang="en-GB" sz="2400" i="1" dirty="0" smtClean="0"/>
-              <a:t>students.</a:t>
+              <a:t>Ideally aimed at university students.</a:t>
             </a:r>
           </a:p>
         </p:txBody>
@@ -11493,7 +11730,7 @@
       </p:grpSpPr>
       <p:sp>
         <p:nvSpPr>
-          <p:cNvPr id="8" name="Title 7"/>
+          <p:cNvPr id="2" name="Title 1"/>
           <p:cNvSpPr>
             <a:spLocks noGrp="1"/>
           </p:cNvSpPr>
@@ -11507,12 +11744,8 @@
           <a:lstStyle/>
           <a:p>
             <a:r>
-              <a:rPr lang="en-GB" dirty="0"/>
-              <a:t>Stubs </a:t>
-            </a:r>
-            <a:r>
               <a:rPr lang="en-GB" dirty="0" smtClean="0"/>
-              <a:t>everywhere</a:t>
+              <a:t>HTML &amp; CSS</a:t>
             </a:r>
             <a:endParaRPr lang="en-GB" dirty="0"/>
           </a:p>
@@ -11520,7 +11753,7 @@
       </p:sp>
       <p:sp>
         <p:nvSpPr>
-          <p:cNvPr id="7" name="Content Placeholder 6"/>
+          <p:cNvPr id="4" name="Content Placeholder 3"/>
           <p:cNvSpPr>
             <a:spLocks noGrp="1"/>
           </p:cNvSpPr>
@@ -11528,11 +11761,14 @@
             <p:ph idx="1"/>
           </p:nvPr>
         </p:nvSpPr>
-        <p:spPr/>
-        <p:txBody>
-          <a:bodyPr>
-            <a:normAutofit/>
-          </a:bodyPr>
+        <p:spPr>
+          <a:xfrm>
+            <a:off x="1097280" y="2057400"/>
+            <a:ext cx="4554918" cy="3811694"/>
+          </a:xfrm>
+        </p:spPr>
+        <p:txBody>
+          <a:bodyPr/>
           <a:lstStyle/>
           <a:p>
             <a:pPr lvl="1">
@@ -11540,8 +11776,8 @@
               <a:buChar char="•"/>
             </a:pPr>
             <a:r>
-              <a:rPr lang="en-GB" sz="2400" dirty="0"/>
-              <a:t>Stubs are useful for an organised approach</a:t>
+              <a:rPr lang="en-GB" sz="2400" dirty="0" smtClean="0"/>
+              <a:t>We build a website so we need HTML (unexpected)</a:t>
             </a:r>
           </a:p>
           <a:p>
@@ -11550,44 +11786,70 @@
               <a:buChar char="•"/>
             </a:pPr>
             <a:r>
-              <a:rPr lang="en-GB" sz="2400" dirty="0"/>
-              <a:t>Making tasks easier to assign</a:t>
-            </a:r>
-          </a:p>
-          <a:p>
-            <a:pPr lvl="1">
-              <a:buFont typeface="Arial" panose="020B0604020202020204" pitchFamily="34" charset="0"/>
-              <a:buChar char="•"/>
+              <a:rPr lang="en-GB" sz="2400" dirty="0" smtClean="0"/>
+              <a:t>Useless if it does the perfect job, but looks like a potato</a:t>
+            </a:r>
+          </a:p>
+          <a:p>
+            <a:pPr marL="201168" lvl="1" indent="0">
+              <a:buNone/>
             </a:pPr>
             <a:r>
-              <a:rPr lang="en-GB" sz="2400" dirty="0"/>
-              <a:t>Making things more understandable for less experienced </a:t>
-            </a:r>
-            <a:r>
-              <a:rPr lang="en-GB" sz="2400" dirty="0" smtClean="0"/>
-              <a:t>people</a:t>
-            </a:r>
-            <a:endParaRPr lang="en-GB" sz="2400" dirty="0"/>
-          </a:p>
-        </p:txBody>
-      </p:sp>
+              <a:rPr lang="en-GB" dirty="0"/>
+              <a:t> </a:t>
+            </a:r>
+            <a:r>
+              <a:rPr lang="en-GB" dirty="0" smtClean="0"/>
+              <a:t> 	</a:t>
+            </a:r>
+            <a:r>
+              <a:rPr lang="en-GB" sz="2200" dirty="0" smtClean="0"/>
+              <a:t>So yeah, we need CSS</a:t>
+            </a:r>
+            <a:endParaRPr lang="en-GB" sz="2200" dirty="0"/>
+          </a:p>
+        </p:txBody>
+      </p:sp>
+      <p:pic>
+        <p:nvPicPr>
+          <p:cNvPr id="6" name="Picture 5"/>
+          <p:cNvPicPr>
+            <a:picLocks noChangeAspect="1"/>
+          </p:cNvPicPr>
+          <p:nvPr/>
+        </p:nvPicPr>
+        <p:blipFill>
+          <a:blip r:embed="rId2">
+            <a:extLst>
+              <a:ext uri="{28A0092B-C50C-407E-A947-70E740481C1C}">
+                <a14:useLocalDpi xmlns:a14="http://schemas.microsoft.com/office/drawing/2010/main" val="0"/>
+              </a:ext>
+            </a:extLst>
+          </a:blip>
+          <a:stretch>
+            <a:fillRect/>
+          </a:stretch>
+        </p:blipFill>
+        <p:spPr>
+          <a:xfrm>
+            <a:off x="5269607" y="1011981"/>
+            <a:ext cx="6922393" cy="5190781"/>
+          </a:xfrm>
+          <a:prstGeom prst="rect">
+            <a:avLst/>
+          </a:prstGeom>
+        </p:spPr>
+      </p:pic>
     </p:spTree>
     <p:extLst>
       <p:ext uri="{BB962C8B-B14F-4D97-AF65-F5344CB8AC3E}">
-        <p14:creationId xmlns:p14="http://schemas.microsoft.com/office/powerpoint/2010/main" val="3161905054"/>
+        <p14:creationId xmlns:p14="http://schemas.microsoft.com/office/powerpoint/2010/main" val="3741746512"/>
       </p:ext>
     </p:extLst>
   </p:cSld>
   <p:clrMapOvr>
     <a:masterClrMapping/>
   </p:clrMapOvr>
-  <p:timing>
-    <p:tnLst>
-      <p:par>
-        <p:cTn id="1" dur="indefinite" restart="never" nodeType="tmRoot"/>
-      </p:par>
-    </p:tnLst>
-  </p:timing>
 </p:sld>
 </file>
 
@@ -11608,89 +11870,6 @@
           <a:chExt cx="0" cy="0"/>
         </a:xfrm>
       </p:grpSpPr>
-      <p:sp>
-        <p:nvSpPr>
-          <p:cNvPr id="2" name="TextBox 1"/>
-          <p:cNvSpPr txBox="1"/>
-          <p:nvPr/>
-        </p:nvSpPr>
-        <p:spPr>
-          <a:xfrm>
-            <a:off x="1541417" y="901338"/>
-            <a:ext cx="3102324" cy="630942"/>
-          </a:xfrm>
-          <a:prstGeom prst="rect">
-            <a:avLst/>
-          </a:prstGeom>
-          <a:noFill/>
-        </p:spPr>
-        <p:txBody>
-          <a:bodyPr wrap="none" rtlCol="0">
-            <a:spAutoFit/>
-          </a:bodyPr>
-          <a:lstStyle/>
-          <a:p>
-            <a:r>
-              <a:rPr lang="en-GB" sz="3500" dirty="0" smtClean="0"/>
-              <a:t>OOP for the win</a:t>
-            </a:r>
-            <a:endParaRPr lang="en-GB" sz="3500" dirty="0"/>
-          </a:p>
-        </p:txBody>
-      </p:sp>
-      <p:sp>
-        <p:nvSpPr>
-          <p:cNvPr id="3" name="TextBox 2"/>
-          <p:cNvSpPr txBox="1"/>
-          <p:nvPr/>
-        </p:nvSpPr>
-        <p:spPr>
-          <a:xfrm>
-            <a:off x="1737360" y="2364377"/>
-            <a:ext cx="4741817" cy="1200329"/>
-          </a:xfrm>
-          <a:prstGeom prst="rect">
-            <a:avLst/>
-          </a:prstGeom>
-          <a:noFill/>
-        </p:spPr>
-        <p:txBody>
-          <a:bodyPr wrap="square" rtlCol="0">
-            <a:spAutoFit/>
-          </a:bodyPr>
-          <a:lstStyle/>
-          <a:p>
-            <a:pPr marL="285750" indent="-285750">
-              <a:buFont typeface="Arial" panose="020B0604020202020204" pitchFamily="34" charset="0"/>
-              <a:buChar char="•"/>
-            </a:pPr>
-            <a:r>
-              <a:rPr lang="en-GB" sz="2400" dirty="0" smtClean="0"/>
-              <a:t>PHP fully supports OOP</a:t>
-            </a:r>
-          </a:p>
-          <a:p>
-            <a:pPr marL="285750" indent="-285750">
-              <a:buFont typeface="Arial" panose="020B0604020202020204" pitchFamily="34" charset="0"/>
-              <a:buChar char="•"/>
-            </a:pPr>
-            <a:r>
-              <a:rPr lang="en-GB" sz="2400" dirty="0" smtClean="0"/>
-              <a:t>Easier to work in team</a:t>
-            </a:r>
-          </a:p>
-          <a:p>
-            <a:pPr marL="285750" indent="-285750">
-              <a:buFont typeface="Arial" panose="020B0604020202020204" pitchFamily="34" charset="0"/>
-              <a:buChar char="•"/>
-            </a:pPr>
-            <a:r>
-              <a:rPr lang="en-GB" sz="2400" dirty="0" smtClean="0"/>
-              <a:t>Going pro scalability</a:t>
-            </a:r>
-          </a:p>
-        </p:txBody>
-      </p:sp>
       <p:pic>
         <p:nvPicPr>
           <p:cNvPr id="4" name="Picture 3"/>
@@ -11713,8 +11892,601 @@
         </p:blipFill>
         <p:spPr>
           <a:xfrm>
-            <a:off x="5531409" y="562223"/>
-            <a:ext cx="5363013" cy="5283117"/>
+            <a:off x="0" y="0"/>
+            <a:ext cx="12192000" cy="6123054"/>
+          </a:xfrm>
+          <a:prstGeom prst="rect">
+            <a:avLst/>
+          </a:prstGeom>
+        </p:spPr>
+      </p:pic>
+    </p:spTree>
+    <p:extLst>
+      <p:ext uri="{BB962C8B-B14F-4D97-AF65-F5344CB8AC3E}">
+        <p14:creationId xmlns:p14="http://schemas.microsoft.com/office/powerpoint/2010/main" val="2340674072"/>
+      </p:ext>
+    </p:extLst>
+  </p:cSld>
+  <p:clrMapOvr>
+    <a:masterClrMapping/>
+  </p:clrMapOvr>
+</p:sld>
+</file>
+
+<file path=ppt/slides/slide22.xml><?xml version="1.0" encoding="utf-8"?>
+<p:sld xmlns:a="http://schemas.openxmlformats.org/drawingml/2006/main" xmlns:r="http://schemas.openxmlformats.org/officeDocument/2006/relationships" xmlns:p="http://schemas.openxmlformats.org/presentationml/2006/main">
+  <p:cSld>
+    <p:spTree>
+      <p:nvGrpSpPr>
+        <p:cNvPr id="1" name=""/>
+        <p:cNvGrpSpPr/>
+        <p:nvPr/>
+      </p:nvGrpSpPr>
+      <p:grpSpPr>
+        <a:xfrm>
+          <a:off x="0" y="0"/>
+          <a:ext cx="0" cy="0"/>
+          <a:chOff x="0" y="0"/>
+          <a:chExt cx="0" cy="0"/>
+        </a:xfrm>
+      </p:grpSpPr>
+      <p:sp>
+        <p:nvSpPr>
+          <p:cNvPr id="2" name="Title 1"/>
+          <p:cNvSpPr>
+            <a:spLocks noGrp="1"/>
+          </p:cNvSpPr>
+          <p:nvPr>
+            <p:ph type="title"/>
+          </p:nvPr>
+        </p:nvSpPr>
+        <p:spPr/>
+        <p:txBody>
+          <a:bodyPr/>
+          <a:lstStyle/>
+          <a:p>
+            <a:r>
+              <a:rPr lang="en-GB" dirty="0" smtClean="0"/>
+              <a:t>PHP &amp; MySQL</a:t>
+            </a:r>
+            <a:endParaRPr lang="en-GB" dirty="0"/>
+          </a:p>
+        </p:txBody>
+      </p:sp>
+      <p:sp>
+        <p:nvSpPr>
+          <p:cNvPr id="3" name="Content Placeholder 2"/>
+          <p:cNvSpPr>
+            <a:spLocks noGrp="1"/>
+          </p:cNvSpPr>
+          <p:nvPr>
+            <p:ph idx="1"/>
+          </p:nvPr>
+        </p:nvSpPr>
+        <p:spPr/>
+        <p:txBody>
+          <a:bodyPr>
+            <a:normAutofit/>
+          </a:bodyPr>
+          <a:lstStyle/>
+          <a:p>
+            <a:pPr lvl="1">
+              <a:buFont typeface="Arial" panose="020B0604020202020204" pitchFamily="34" charset="0"/>
+              <a:buChar char="•"/>
+            </a:pPr>
+            <a:r>
+              <a:rPr lang="en-GB" sz="2400" dirty="0" smtClean="0"/>
+              <a:t>PHP </a:t>
+            </a:r>
+          </a:p>
+          <a:p>
+            <a:pPr lvl="2">
+              <a:buFont typeface="Arial" panose="020B0604020202020204" pitchFamily="34" charset="0"/>
+              <a:buChar char="•"/>
+            </a:pPr>
+            <a:r>
+              <a:rPr lang="en-GB" sz="2000" dirty="0" smtClean="0"/>
+              <a:t>has a wide documentation available, and is easy to learn</a:t>
+            </a:r>
+          </a:p>
+          <a:p>
+            <a:pPr lvl="2">
+              <a:buFont typeface="Arial" panose="020B0604020202020204" pitchFamily="34" charset="0"/>
+              <a:buChar char="•"/>
+            </a:pPr>
+            <a:r>
+              <a:rPr lang="en-GB" sz="2000" dirty="0" smtClean="0"/>
+              <a:t>Works great with MySQL</a:t>
+            </a:r>
+          </a:p>
+          <a:p>
+            <a:pPr lvl="2">
+              <a:buFont typeface="Arial" panose="020B0604020202020204" pitchFamily="34" charset="0"/>
+              <a:buChar char="•"/>
+            </a:pPr>
+            <a:r>
+              <a:rPr lang="en-GB" sz="2000" dirty="0" smtClean="0"/>
+              <a:t>Processing all user inputs</a:t>
+            </a:r>
+          </a:p>
+          <a:p>
+            <a:pPr lvl="2">
+              <a:buFont typeface="Arial" panose="020B0604020202020204" pitchFamily="34" charset="0"/>
+              <a:buChar char="•"/>
+            </a:pPr>
+            <a:r>
+              <a:rPr lang="en-GB" sz="2000" dirty="0" smtClean="0"/>
+              <a:t>Good for heavy computing (matching script)</a:t>
+            </a:r>
+          </a:p>
+          <a:p>
+            <a:pPr lvl="1">
+              <a:buFont typeface="Arial" panose="020B0604020202020204" pitchFamily="34" charset="0"/>
+              <a:buChar char="•"/>
+            </a:pPr>
+            <a:r>
+              <a:rPr lang="en-GB" sz="2400" dirty="0" smtClean="0"/>
+              <a:t>MySQL </a:t>
+            </a:r>
+          </a:p>
+          <a:p>
+            <a:pPr lvl="2">
+              <a:buFont typeface="Arial" panose="020B0604020202020204" pitchFamily="34" charset="0"/>
+              <a:buChar char="•"/>
+            </a:pPr>
+            <a:r>
+              <a:rPr lang="en-GB" sz="2000" dirty="0" smtClean="0"/>
+              <a:t>Fast</a:t>
+            </a:r>
+          </a:p>
+          <a:p>
+            <a:pPr lvl="2">
+              <a:buFont typeface="Arial" panose="020B0604020202020204" pitchFamily="34" charset="0"/>
+              <a:buChar char="•"/>
+            </a:pPr>
+            <a:r>
+              <a:rPr lang="en-GB" sz="2000" dirty="0" smtClean="0"/>
+              <a:t>Secure</a:t>
+            </a:r>
+          </a:p>
+          <a:p>
+            <a:pPr lvl="2">
+              <a:buFont typeface="Arial" panose="020B0604020202020204" pitchFamily="34" charset="0"/>
+              <a:buChar char="•"/>
+            </a:pPr>
+            <a:r>
+              <a:rPr lang="en-GB" sz="2000" dirty="0" smtClean="0"/>
+              <a:t>Easy to learn</a:t>
+            </a:r>
+          </a:p>
+          <a:p>
+            <a:pPr lvl="2">
+              <a:buFont typeface="Arial" panose="020B0604020202020204" pitchFamily="34" charset="0"/>
+              <a:buChar char="•"/>
+            </a:pPr>
+            <a:r>
+              <a:rPr lang="en-GB" sz="2000" dirty="0" smtClean="0"/>
+              <a:t>FREE!</a:t>
+            </a:r>
+          </a:p>
+          <a:p>
+            <a:pPr lvl="1">
+              <a:buFont typeface="Arial" panose="020B0604020202020204" pitchFamily="34" charset="0"/>
+              <a:buChar char="•"/>
+            </a:pPr>
+            <a:endParaRPr lang="en-GB" sz="2400" dirty="0"/>
+          </a:p>
+        </p:txBody>
+      </p:sp>
+      <p:pic>
+        <p:nvPicPr>
+          <p:cNvPr id="4" name="Picture 3"/>
+          <p:cNvPicPr>
+            <a:picLocks noChangeAspect="1"/>
+          </p:cNvPicPr>
+          <p:nvPr/>
+        </p:nvPicPr>
+        <p:blipFill>
+          <a:blip r:embed="rId2">
+            <a:extLst>
+              <a:ext uri="{28A0092B-C50C-407E-A947-70E740481C1C}">
+                <a14:useLocalDpi xmlns:a14="http://schemas.microsoft.com/office/drawing/2010/main" val="0"/>
+              </a:ext>
+            </a:extLst>
+          </a:blip>
+          <a:stretch>
+            <a:fillRect/>
+          </a:stretch>
+        </p:blipFill>
+        <p:spPr>
+          <a:xfrm>
+            <a:off x="6781799" y="2795116"/>
+            <a:ext cx="5410201" cy="3073978"/>
+          </a:xfrm>
+          <a:prstGeom prst="rect">
+            <a:avLst/>
+          </a:prstGeom>
+        </p:spPr>
+      </p:pic>
+    </p:spTree>
+    <p:extLst>
+      <p:ext uri="{BB962C8B-B14F-4D97-AF65-F5344CB8AC3E}">
+        <p14:creationId xmlns:p14="http://schemas.microsoft.com/office/powerpoint/2010/main" val="3916045223"/>
+      </p:ext>
+    </p:extLst>
+  </p:cSld>
+  <p:clrMapOvr>
+    <a:masterClrMapping/>
+  </p:clrMapOvr>
+</p:sld>
+</file>
+
+<file path=ppt/slides/slide23.xml><?xml version="1.0" encoding="utf-8"?>
+<p:sld xmlns:a="http://schemas.openxmlformats.org/drawingml/2006/main" xmlns:r="http://schemas.openxmlformats.org/officeDocument/2006/relationships" xmlns:p="http://schemas.openxmlformats.org/presentationml/2006/main">
+  <p:cSld>
+    <p:spTree>
+      <p:nvGrpSpPr>
+        <p:cNvPr id="1" name=""/>
+        <p:cNvGrpSpPr/>
+        <p:nvPr/>
+      </p:nvGrpSpPr>
+      <p:grpSpPr>
+        <a:xfrm>
+          <a:off x="0" y="0"/>
+          <a:ext cx="0" cy="0"/>
+          <a:chOff x="0" y="0"/>
+          <a:chExt cx="0" cy="0"/>
+        </a:xfrm>
+      </p:grpSpPr>
+      <p:sp>
+        <p:nvSpPr>
+          <p:cNvPr id="8" name="Title 7"/>
+          <p:cNvSpPr>
+            <a:spLocks noGrp="1"/>
+          </p:cNvSpPr>
+          <p:nvPr>
+            <p:ph type="title"/>
+          </p:nvPr>
+        </p:nvSpPr>
+        <p:spPr/>
+        <p:txBody>
+          <a:bodyPr/>
+          <a:lstStyle/>
+          <a:p>
+            <a:r>
+              <a:rPr lang="en-GB" dirty="0"/>
+              <a:t>Stubs </a:t>
+            </a:r>
+            <a:r>
+              <a:rPr lang="en-GB" dirty="0" smtClean="0"/>
+              <a:t>everywhere</a:t>
+            </a:r>
+            <a:endParaRPr lang="en-GB" dirty="0"/>
+          </a:p>
+        </p:txBody>
+      </p:sp>
+      <p:sp>
+        <p:nvSpPr>
+          <p:cNvPr id="7" name="Content Placeholder 6"/>
+          <p:cNvSpPr>
+            <a:spLocks noGrp="1"/>
+          </p:cNvSpPr>
+          <p:nvPr>
+            <p:ph idx="4294967295"/>
+          </p:nvPr>
+        </p:nvSpPr>
+        <p:spPr>
+          <a:xfrm>
+            <a:off x="1193800" y="2112963"/>
+            <a:ext cx="10058400" cy="4022725"/>
+          </a:xfrm>
+        </p:spPr>
+        <p:txBody>
+          <a:bodyPr>
+            <a:normAutofit/>
+          </a:bodyPr>
+          <a:lstStyle/>
+          <a:p>
+            <a:pPr lvl="1">
+              <a:buFont typeface="Arial" panose="020B0604020202020204" pitchFamily="34" charset="0"/>
+              <a:buChar char="•"/>
+            </a:pPr>
+            <a:r>
+              <a:rPr lang="en-GB" sz="2400" dirty="0" smtClean="0"/>
+              <a:t>Stub every file that needs to be done, commenting it</a:t>
+            </a:r>
+          </a:p>
+          <a:p>
+            <a:pPr lvl="1">
+              <a:buFont typeface="Arial" panose="020B0604020202020204" pitchFamily="34" charset="0"/>
+              <a:buChar char="•"/>
+            </a:pPr>
+            <a:r>
+              <a:rPr lang="en-GB" sz="2400" dirty="0" smtClean="0"/>
+              <a:t>U</a:t>
+            </a:r>
+            <a:r>
+              <a:rPr lang="en-GB" sz="2400" dirty="0" smtClean="0"/>
+              <a:t>seful </a:t>
+            </a:r>
+            <a:r>
+              <a:rPr lang="en-GB" sz="2400" dirty="0"/>
+              <a:t>for an organised approach</a:t>
+            </a:r>
+          </a:p>
+          <a:p>
+            <a:pPr lvl="1">
+              <a:buFont typeface="Arial" panose="020B0604020202020204" pitchFamily="34" charset="0"/>
+              <a:buChar char="•"/>
+            </a:pPr>
+            <a:r>
+              <a:rPr lang="en-GB" sz="2400" dirty="0"/>
+              <a:t>Making tasks easier to assign</a:t>
+            </a:r>
+          </a:p>
+          <a:p>
+            <a:pPr lvl="1">
+              <a:buFont typeface="Arial" panose="020B0604020202020204" pitchFamily="34" charset="0"/>
+              <a:buChar char="•"/>
+            </a:pPr>
+            <a:r>
+              <a:rPr lang="en-GB" sz="2400" dirty="0"/>
+              <a:t>Making things more understandable for less experienced </a:t>
+            </a:r>
+            <a:r>
+              <a:rPr lang="en-GB" sz="2400" dirty="0" smtClean="0"/>
+              <a:t>people</a:t>
+            </a:r>
+            <a:endParaRPr lang="en-GB" sz="2400" dirty="0"/>
+          </a:p>
+        </p:txBody>
+      </p:sp>
+    </p:spTree>
+    <p:extLst>
+      <p:ext uri="{BB962C8B-B14F-4D97-AF65-F5344CB8AC3E}">
+        <p14:creationId xmlns:p14="http://schemas.microsoft.com/office/powerpoint/2010/main" val="3161905054"/>
+      </p:ext>
+    </p:extLst>
+  </p:cSld>
+  <p:clrMapOvr>
+    <a:masterClrMapping/>
+  </p:clrMapOvr>
+  <p:timing>
+    <p:tnLst>
+      <p:par>
+        <p:cTn id="1" dur="indefinite" restart="never" nodeType="tmRoot"/>
+      </p:par>
+    </p:tnLst>
+  </p:timing>
+</p:sld>
+</file>
+
+<file path=ppt/slides/slide24.xml><?xml version="1.0" encoding="utf-8"?>
+<p:sld xmlns:a="http://schemas.openxmlformats.org/drawingml/2006/main" xmlns:r="http://schemas.openxmlformats.org/officeDocument/2006/relationships" xmlns:p="http://schemas.openxmlformats.org/presentationml/2006/main">
+  <p:cSld>
+    <p:spTree>
+      <p:nvGrpSpPr>
+        <p:cNvPr id="1" name=""/>
+        <p:cNvGrpSpPr/>
+        <p:nvPr/>
+      </p:nvGrpSpPr>
+      <p:grpSpPr>
+        <a:xfrm>
+          <a:off x="0" y="0"/>
+          <a:ext cx="0" cy="0"/>
+          <a:chOff x="0" y="0"/>
+          <a:chExt cx="0" cy="0"/>
+        </a:xfrm>
+      </p:grpSpPr>
+      <p:sp>
+        <p:nvSpPr>
+          <p:cNvPr id="5" name="Title 4"/>
+          <p:cNvSpPr>
+            <a:spLocks noGrp="1"/>
+          </p:cNvSpPr>
+          <p:nvPr>
+            <p:ph type="title"/>
+          </p:nvPr>
+        </p:nvSpPr>
+        <p:spPr>
+          <a:xfrm>
+            <a:off x="1097280" y="286603"/>
+            <a:ext cx="5684837" cy="1450757"/>
+          </a:xfrm>
+        </p:spPr>
+        <p:txBody>
+          <a:bodyPr/>
+          <a:lstStyle/>
+          <a:p>
+            <a:r>
+              <a:rPr lang="en-GB" dirty="0" smtClean="0"/>
+              <a:t>OOP for the win!</a:t>
+            </a:r>
+            <a:endParaRPr lang="en-GB" dirty="0"/>
+          </a:p>
+        </p:txBody>
+      </p:sp>
+      <p:sp>
+        <p:nvSpPr>
+          <p:cNvPr id="3" name="TextBox 2"/>
+          <p:cNvSpPr txBox="1"/>
+          <p:nvPr/>
+        </p:nvSpPr>
+        <p:spPr>
+          <a:xfrm>
+            <a:off x="1097279" y="2097677"/>
+            <a:ext cx="5684837" cy="1908215"/>
+          </a:xfrm>
+          <a:prstGeom prst="rect">
+            <a:avLst/>
+          </a:prstGeom>
+          <a:noFill/>
+        </p:spPr>
+        <p:txBody>
+          <a:bodyPr wrap="square" rtlCol="0">
+            <a:spAutoFit/>
+          </a:bodyPr>
+          <a:lstStyle/>
+          <a:p>
+            <a:pPr marL="742950" lvl="1" indent="-285750">
+              <a:buClr>
+                <a:schemeClr val="accent1"/>
+              </a:buClr>
+              <a:buFont typeface="Arial" panose="020B0604020202020204" pitchFamily="34" charset="0"/>
+              <a:buChar char="•"/>
+            </a:pPr>
+            <a:r>
+              <a:rPr lang="en-GB" sz="2400" dirty="0" smtClean="0">
+                <a:solidFill>
+                  <a:schemeClr val="tx1">
+                    <a:lumMod val="75000"/>
+                    <a:lumOff val="25000"/>
+                  </a:schemeClr>
+                </a:solidFill>
+              </a:rPr>
+              <a:t>PHP fully supports OOP</a:t>
+            </a:r>
+          </a:p>
+          <a:p>
+            <a:pPr marL="742950" lvl="1" indent="-285750">
+              <a:buClr>
+                <a:schemeClr val="accent1"/>
+              </a:buClr>
+              <a:buFont typeface="Arial" panose="020B0604020202020204" pitchFamily="34" charset="0"/>
+              <a:buChar char="•"/>
+            </a:pPr>
+            <a:r>
+              <a:rPr lang="en-GB" sz="2400" dirty="0" smtClean="0">
+                <a:solidFill>
+                  <a:schemeClr val="tx1">
+                    <a:lumMod val="75000"/>
+                    <a:lumOff val="25000"/>
+                  </a:schemeClr>
+                </a:solidFill>
+              </a:rPr>
+              <a:t>Easier to work in </a:t>
+            </a:r>
+            <a:r>
+              <a:rPr lang="en-GB" sz="2400" dirty="0" smtClean="0">
+                <a:solidFill>
+                  <a:schemeClr val="tx1">
+                    <a:lumMod val="75000"/>
+                    <a:lumOff val="25000"/>
+                  </a:schemeClr>
+                </a:solidFill>
+              </a:rPr>
+              <a:t>team</a:t>
+            </a:r>
+          </a:p>
+          <a:p>
+            <a:pPr lvl="2">
+              <a:buClr>
+                <a:schemeClr val="accent1"/>
+              </a:buClr>
+            </a:pPr>
+            <a:r>
+              <a:rPr lang="en-GB" sz="2200" dirty="0" smtClean="0">
+                <a:solidFill>
+                  <a:schemeClr val="tx1">
+                    <a:lumMod val="75000"/>
+                    <a:lumOff val="25000"/>
+                  </a:schemeClr>
+                </a:solidFill>
+              </a:rPr>
+              <a:t>and not mess with each other’s work</a:t>
+            </a:r>
+            <a:endParaRPr lang="en-GB" sz="2200" dirty="0" smtClean="0">
+              <a:solidFill>
+                <a:schemeClr val="tx1">
+                  <a:lumMod val="75000"/>
+                  <a:lumOff val="25000"/>
+                </a:schemeClr>
+              </a:solidFill>
+            </a:endParaRPr>
+          </a:p>
+          <a:p>
+            <a:pPr marL="742950" lvl="1" indent="-285750">
+              <a:buClr>
+                <a:schemeClr val="accent1"/>
+              </a:buClr>
+              <a:buFont typeface="Arial" panose="020B0604020202020204" pitchFamily="34" charset="0"/>
+              <a:buChar char="•"/>
+            </a:pPr>
+            <a:r>
+              <a:rPr lang="en-GB" sz="2400" dirty="0" smtClean="0">
+                <a:solidFill>
+                  <a:schemeClr val="tx1">
+                    <a:lumMod val="75000"/>
+                    <a:lumOff val="25000"/>
+                  </a:schemeClr>
+                </a:solidFill>
+              </a:rPr>
+              <a:t>Going pro </a:t>
+            </a:r>
+            <a:r>
+              <a:rPr lang="en-GB" sz="2400" dirty="0" smtClean="0">
+                <a:solidFill>
+                  <a:schemeClr val="tx1">
+                    <a:lumMod val="75000"/>
+                    <a:lumOff val="25000"/>
+                  </a:schemeClr>
+                </a:solidFill>
+              </a:rPr>
+              <a:t>scalability</a:t>
+            </a:r>
+          </a:p>
+          <a:p>
+            <a:pPr lvl="2">
+              <a:buClr>
+                <a:schemeClr val="accent1"/>
+              </a:buClr>
+            </a:pPr>
+            <a:r>
+              <a:rPr lang="en-GB" sz="2200" dirty="0" smtClean="0">
+                <a:solidFill>
+                  <a:schemeClr val="tx1">
+                    <a:lumMod val="75000"/>
+                    <a:lumOff val="25000"/>
+                  </a:schemeClr>
+                </a:solidFill>
+              </a:rPr>
+              <a:t>for possible future expansion</a:t>
+            </a:r>
+            <a:endParaRPr lang="en-GB" sz="2200" dirty="0" smtClean="0">
+              <a:solidFill>
+                <a:schemeClr val="tx1">
+                  <a:lumMod val="75000"/>
+                  <a:lumOff val="25000"/>
+                </a:schemeClr>
+              </a:solidFill>
+            </a:endParaRPr>
+          </a:p>
+        </p:txBody>
+      </p:sp>
+      <p:pic>
+        <p:nvPicPr>
+          <p:cNvPr id="6" name="Picture 5"/>
+          <p:cNvPicPr>
+            <a:picLocks noChangeAspect="1"/>
+          </p:cNvPicPr>
+          <p:nvPr/>
+        </p:nvPicPr>
+        <p:blipFill>
+          <a:blip r:embed="rId2">
+            <a:extLst>
+              <a:ext uri="{28A0092B-C50C-407E-A947-70E740481C1C}">
+                <a14:useLocalDpi xmlns:a14="http://schemas.microsoft.com/office/drawing/2010/main" val="0"/>
+              </a:ext>
+            </a:extLst>
+          </a:blip>
+          <a:stretch>
+            <a:fillRect/>
+          </a:stretch>
+        </p:blipFill>
+        <p:spPr>
+          <a:xfrm>
+            <a:off x="6909117" y="622300"/>
+            <a:ext cx="5003656" cy="4929113"/>
           </a:xfrm>
           <a:prstGeom prst="rect">
             <a:avLst/>
@@ -11741,7 +12513,7 @@
 </p:sld>
 </file>
 
-<file path=ppt/slides/slide22.xml><?xml version="1.0" encoding="utf-8"?>
+<file path=ppt/slides/slide25.xml><?xml version="1.0" encoding="utf-8"?>
 <p:sld xmlns:a="http://schemas.openxmlformats.org/drawingml/2006/main" xmlns:r="http://schemas.openxmlformats.org/officeDocument/2006/relationships" xmlns:p="http://schemas.openxmlformats.org/presentationml/2006/main">
   <p:cSld>
     <p:spTree>
@@ -11760,14 +12532,37 @@
       </p:grpSpPr>
       <p:sp>
         <p:nvSpPr>
-          <p:cNvPr id="3" name="TextBox 2"/>
+          <p:cNvPr id="2" name="Title 1"/>
+          <p:cNvSpPr>
+            <a:spLocks noGrp="1"/>
+          </p:cNvSpPr>
+          <p:nvPr>
+            <p:ph type="title"/>
+          </p:nvPr>
+        </p:nvSpPr>
+        <p:spPr/>
+        <p:txBody>
+          <a:bodyPr/>
+          <a:lstStyle/>
+          <a:p>
+            <a:r>
+              <a:rPr lang="en-GB" dirty="0" smtClean="0"/>
+              <a:t>Good teamwork == good result</a:t>
+            </a:r>
+            <a:endParaRPr lang="en-GB" dirty="0"/>
+          </a:p>
+        </p:txBody>
+      </p:sp>
+      <p:sp>
+        <p:nvSpPr>
+          <p:cNvPr id="5" name="TextBox 4"/>
           <p:cNvSpPr txBox="1"/>
           <p:nvPr/>
         </p:nvSpPr>
         <p:spPr>
           <a:xfrm>
-            <a:off x="1698171" y="1045029"/>
-            <a:ext cx="6602898" cy="630942"/>
+            <a:off x="1698171" y="2403566"/>
+            <a:ext cx="9393918" cy="1569660"/>
           </a:xfrm>
           <a:prstGeom prst="rect">
             <a:avLst/>
@@ -11780,76 +12575,189 @@
           </a:bodyPr>
           <a:lstStyle/>
           <a:p>
-            <a:r>
-              <a:rPr lang="en-GB" sz="3500" dirty="0" smtClean="0"/>
-              <a:t>Good teamwork means good result</a:t>
-            </a:r>
-            <a:endParaRPr lang="en-GB" sz="3500" dirty="0"/>
-          </a:p>
-        </p:txBody>
-      </p:sp>
-      <p:sp>
-        <p:nvSpPr>
-          <p:cNvPr id="5" name="TextBox 4"/>
-          <p:cNvSpPr txBox="1"/>
-          <p:nvPr/>
-        </p:nvSpPr>
-        <p:spPr>
-          <a:xfrm>
-            <a:off x="1698171" y="2403566"/>
-            <a:ext cx="9317294" cy="1200329"/>
-          </a:xfrm>
-          <a:prstGeom prst="rect">
-            <a:avLst/>
-          </a:prstGeom>
-          <a:noFill/>
-        </p:spPr>
-        <p:txBody>
-          <a:bodyPr wrap="none" rtlCol="0">
-            <a:spAutoFit/>
-          </a:bodyPr>
-          <a:lstStyle/>
-          <a:p>
             <a:pPr marL="285750" indent="-285750">
+              <a:buClr>
+                <a:schemeClr val="accent1"/>
+              </a:buClr>
               <a:buFont typeface="Arial" panose="020B0604020202020204" pitchFamily="34" charset="0"/>
               <a:buChar char="•"/>
             </a:pPr>
             <a:r>
-              <a:rPr lang="en-GB" sz="2400" dirty="0" smtClean="0"/>
+              <a:rPr lang="en-GB" sz="2400" dirty="0" smtClean="0">
+                <a:solidFill>
+                  <a:schemeClr val="tx1">
+                    <a:lumMod val="75000"/>
+                    <a:lumOff val="25000"/>
+                  </a:schemeClr>
+                </a:solidFill>
+              </a:rPr>
               <a:t>Use </a:t>
             </a:r>
             <a:r>
-              <a:rPr lang="en-GB" sz="2400" dirty="0" err="1" smtClean="0"/>
+              <a:rPr lang="en-GB" sz="2400" dirty="0" err="1" smtClean="0">
+                <a:solidFill>
+                  <a:schemeClr val="tx1">
+                    <a:lumMod val="75000"/>
+                    <a:lumOff val="25000"/>
+                  </a:schemeClr>
+                </a:solidFill>
+              </a:rPr>
               <a:t>GitLab</a:t>
             </a:r>
             <a:r>
-              <a:rPr lang="en-GB" sz="2400" dirty="0"/>
+              <a:rPr lang="en-GB" sz="2400" dirty="0">
+                <a:solidFill>
+                  <a:schemeClr val="tx1">
+                    <a:lumMod val="75000"/>
+                    <a:lumOff val="25000"/>
+                  </a:schemeClr>
+                </a:solidFill>
+              </a:rPr>
               <a:t> </a:t>
             </a:r>
             <a:r>
-              <a:rPr lang="en-GB" sz="2400" dirty="0" smtClean="0"/>
-              <a:t>for good version control</a:t>
+              <a:rPr lang="en-GB" sz="2400" dirty="0" smtClean="0">
+                <a:solidFill>
+                  <a:schemeClr val="tx1">
+                    <a:lumMod val="75000"/>
+                    <a:lumOff val="25000"/>
+                  </a:schemeClr>
+                </a:solidFill>
+              </a:rPr>
+              <a:t>for </a:t>
+            </a:r>
+            <a:r>
+              <a:rPr lang="en-GB" sz="2400" dirty="0" smtClean="0">
+                <a:solidFill>
+                  <a:schemeClr val="tx1">
+                    <a:lumMod val="75000"/>
+                    <a:lumOff val="25000"/>
+                  </a:schemeClr>
+                </a:solidFill>
+              </a:rPr>
+              <a:t>proper</a:t>
+            </a:r>
+            <a:r>
+              <a:rPr lang="en-GB" sz="2400" dirty="0" smtClean="0">
+                <a:solidFill>
+                  <a:schemeClr val="tx1">
+                    <a:lumMod val="75000"/>
+                    <a:lumOff val="25000"/>
+                  </a:schemeClr>
+                </a:solidFill>
+              </a:rPr>
+              <a:t> </a:t>
+            </a:r>
+            <a:r>
+              <a:rPr lang="en-GB" sz="2400" dirty="0" smtClean="0">
+                <a:solidFill>
+                  <a:schemeClr val="tx1">
+                    <a:lumMod val="75000"/>
+                    <a:lumOff val="25000"/>
+                  </a:schemeClr>
+                </a:solidFill>
+              </a:rPr>
+              <a:t>version control</a:t>
             </a:r>
           </a:p>
           <a:p>
             <a:pPr marL="285750" indent="-285750">
+              <a:buClr>
+                <a:schemeClr val="accent1"/>
+              </a:buClr>
               <a:buFont typeface="Arial" panose="020B0604020202020204" pitchFamily="34" charset="0"/>
               <a:buChar char="•"/>
             </a:pPr>
             <a:r>
-              <a:rPr lang="en-GB" sz="2400" dirty="0" smtClean="0"/>
+              <a:rPr lang="en-GB" sz="2400" dirty="0" smtClean="0">
+                <a:solidFill>
+                  <a:schemeClr val="tx1">
+                    <a:lumMod val="75000"/>
+                    <a:lumOff val="25000"/>
+                  </a:schemeClr>
+                </a:solidFill>
+              </a:rPr>
               <a:t>Allocate weekly tasks to each team member (=&gt; 6 tasks/week)</a:t>
             </a:r>
           </a:p>
           <a:p>
             <a:pPr marL="285750" indent="-285750">
+              <a:buClr>
+                <a:schemeClr val="accent1"/>
+              </a:buClr>
               <a:buFont typeface="Arial" panose="020B0604020202020204" pitchFamily="34" charset="0"/>
               <a:buChar char="•"/>
             </a:pPr>
             <a:r>
-              <a:rPr lang="en-GB" sz="2400" dirty="0" smtClean="0"/>
-              <a:t>From time to time, tasks will be to improve/retouch already made stuff</a:t>
-            </a:r>
+              <a:rPr lang="en-GB" sz="2400" dirty="0" smtClean="0">
+                <a:solidFill>
+                  <a:schemeClr val="tx1">
+                    <a:lumMod val="75000"/>
+                    <a:lumOff val="25000"/>
+                  </a:schemeClr>
+                </a:solidFill>
+              </a:rPr>
+              <a:t>From time to </a:t>
+            </a:r>
+            <a:r>
+              <a:rPr lang="en-GB" sz="2400" dirty="0" smtClean="0">
+                <a:solidFill>
+                  <a:schemeClr val="tx1">
+                    <a:lumMod val="75000"/>
+                    <a:lumOff val="25000"/>
+                  </a:schemeClr>
+                </a:solidFill>
+              </a:rPr>
+              <a:t>time, improve/retouch/test and debug already </a:t>
+            </a:r>
+            <a:r>
+              <a:rPr lang="en-GB" sz="2400" dirty="0" smtClean="0">
+                <a:solidFill>
+                  <a:schemeClr val="tx1">
+                    <a:lumMod val="75000"/>
+                    <a:lumOff val="25000"/>
+                  </a:schemeClr>
+                </a:solidFill>
+              </a:rPr>
+              <a:t>made </a:t>
+            </a:r>
+            <a:r>
+              <a:rPr lang="en-GB" sz="2400" dirty="0" smtClean="0">
+                <a:solidFill>
+                  <a:schemeClr val="tx1">
+                    <a:lumMod val="75000"/>
+                    <a:lumOff val="25000"/>
+                  </a:schemeClr>
+                </a:solidFill>
+              </a:rPr>
+              <a:t>stuff</a:t>
+            </a:r>
+          </a:p>
+          <a:p>
+            <a:pPr lvl="1">
+              <a:buClr>
+                <a:schemeClr val="accent1"/>
+              </a:buClr>
+            </a:pPr>
+            <a:r>
+              <a:rPr lang="en-GB" sz="2200" dirty="0" smtClean="0">
+                <a:solidFill>
+                  <a:schemeClr val="tx1">
+                    <a:lumMod val="75000"/>
+                    <a:lumOff val="25000"/>
+                  </a:schemeClr>
+                </a:solidFill>
+              </a:rPr>
+              <a:t>(especially debug)</a:t>
+            </a:r>
+            <a:endParaRPr lang="en-GB" sz="2200" dirty="0" smtClean="0">
+              <a:solidFill>
+                <a:schemeClr val="tx1">
+                  <a:lumMod val="75000"/>
+                  <a:lumOff val="25000"/>
+                </a:schemeClr>
+              </a:solidFill>
+            </a:endParaRPr>
           </a:p>
         </p:txBody>
       </p:sp>
@@ -11873,7 +12781,7 @@
 </p:sld>
 </file>
 
-<file path=ppt/slides/slide23.xml><?xml version="1.0" encoding="utf-8"?>
+<file path=ppt/slides/slide26.xml><?xml version="1.0" encoding="utf-8"?>
 <p:sld xmlns:a="http://schemas.openxmlformats.org/drawingml/2006/main" xmlns:r="http://schemas.openxmlformats.org/officeDocument/2006/relationships" xmlns:p="http://schemas.openxmlformats.org/presentationml/2006/main">
   <p:cSld>
     <p:spTree>
@@ -11892,20 +12800,551 @@
       </p:grpSpPr>
       <p:sp>
         <p:nvSpPr>
+          <p:cNvPr id="2" name="Title 1"/>
+          <p:cNvSpPr>
+            <a:spLocks noGrp="1"/>
+          </p:cNvSpPr>
+          <p:nvPr>
+            <p:ph type="title"/>
+          </p:nvPr>
+        </p:nvSpPr>
+        <p:spPr/>
+        <p:txBody>
+          <a:bodyPr/>
+          <a:lstStyle/>
+          <a:p>
+            <a:r>
+              <a:rPr lang="en-GB" dirty="0" smtClean="0"/>
+              <a:t>Planning before everything</a:t>
+            </a:r>
+            <a:endParaRPr lang="en-GB" dirty="0"/>
+          </a:p>
+        </p:txBody>
+      </p:sp>
+      <p:sp>
+        <p:nvSpPr>
+          <p:cNvPr id="5" name="Content Placeholder 4"/>
+          <p:cNvSpPr txBox="1">
+            <a:spLocks noGrp="1"/>
+          </p:cNvSpPr>
+          <p:nvPr>
+            <p:ph idx="1"/>
+          </p:nvPr>
+        </p:nvSpPr>
+        <p:spPr>
+          <a:xfrm>
+            <a:off x="1097280" y="2099734"/>
+            <a:ext cx="9252982" cy="3422475"/>
+          </a:xfrm>
+          <a:prstGeom prst="rect">
+            <a:avLst/>
+          </a:prstGeom>
+          <a:noFill/>
+        </p:spPr>
+        <p:txBody>
+          <a:bodyPr wrap="none" rtlCol="0">
+            <a:spAutoFit/>
+          </a:bodyPr>
+          <a:lstStyle/>
+          <a:p>
+            <a:pPr lvl="1">
+              <a:buFont typeface="Arial" panose="020B0604020202020204" pitchFamily="34" charset="0"/>
+              <a:buChar char="•"/>
+            </a:pPr>
+            <a:r>
+              <a:rPr lang="en-GB" sz="2400" dirty="0" smtClean="0"/>
+              <a:t>Weekly meetings on Friday</a:t>
+            </a:r>
+          </a:p>
+          <a:p>
+            <a:pPr lvl="1">
+              <a:buFont typeface="Arial" panose="020B0604020202020204" pitchFamily="34" charset="0"/>
+              <a:buChar char="•"/>
+            </a:pPr>
+            <a:r>
+              <a:rPr lang="en-GB" sz="2400" dirty="0" smtClean="0"/>
+              <a:t>Discuss how the previous tasks went</a:t>
+            </a:r>
+          </a:p>
+          <a:p>
+            <a:pPr lvl="1">
+              <a:buFont typeface="Arial" panose="020B0604020202020204" pitchFamily="34" charset="0"/>
+              <a:buChar char="•"/>
+            </a:pPr>
+            <a:r>
+              <a:rPr lang="en-GB" sz="2400" dirty="0" smtClean="0"/>
+              <a:t>Discuss and (re)assign the next tasks for each other</a:t>
+            </a:r>
+          </a:p>
+          <a:p>
+            <a:pPr lvl="1">
+              <a:buFont typeface="Arial" panose="020B0604020202020204" pitchFamily="34" charset="0"/>
+              <a:buChar char="•"/>
+            </a:pPr>
+            <a:r>
+              <a:rPr lang="en-GB" sz="2400" dirty="0" smtClean="0"/>
+              <a:t>Allocate tasks considering everyone’s strengths and weaknesses</a:t>
+            </a:r>
+          </a:p>
+          <a:p>
+            <a:pPr lvl="2">
+              <a:buFont typeface="Wingdings" panose="05000000000000000000" pitchFamily="2" charset="2"/>
+              <a:buChar char="Ø"/>
+            </a:pPr>
+            <a:r>
+              <a:rPr lang="en-GB" sz="2000" dirty="0" smtClean="0"/>
+              <a:t>Alex would take most of the PHP-heavy tasks, also the debugging</a:t>
+            </a:r>
+          </a:p>
+          <a:p>
+            <a:pPr lvl="2">
+              <a:buFont typeface="Wingdings" panose="05000000000000000000" pitchFamily="2" charset="2"/>
+              <a:buChar char="Ø"/>
+            </a:pPr>
+            <a:r>
+              <a:rPr lang="en-GB" sz="2000" dirty="0" smtClean="0"/>
+              <a:t>Daniel would take the main front-end related tasks, and the design retouching ones</a:t>
+            </a:r>
+          </a:p>
+          <a:p>
+            <a:pPr lvl="2">
+              <a:buFont typeface="Wingdings" panose="05000000000000000000" pitchFamily="2" charset="2"/>
+              <a:buChar char="Ø"/>
+            </a:pPr>
+            <a:r>
+              <a:rPr lang="en-GB" sz="2000" dirty="0" err="1" smtClean="0"/>
+              <a:t>Elnur</a:t>
+            </a:r>
+            <a:r>
+              <a:rPr lang="en-GB" sz="2000" dirty="0" smtClean="0"/>
+              <a:t> would mostly take the basic front-end / design tasks, along with testing</a:t>
+            </a:r>
+          </a:p>
+          <a:p>
+            <a:pPr lvl="2">
+              <a:buFont typeface="Wingdings" panose="05000000000000000000" pitchFamily="2" charset="2"/>
+              <a:buChar char="Ø"/>
+            </a:pPr>
+            <a:r>
+              <a:rPr lang="en-GB" sz="2000" dirty="0" smtClean="0"/>
+              <a:t>Liam would usually take the simpler back-end ones, along with testing</a:t>
+            </a:r>
+          </a:p>
+          <a:p>
+            <a:pPr lvl="2">
+              <a:buFont typeface="Wingdings" panose="05000000000000000000" pitchFamily="2" charset="2"/>
+              <a:buChar char="Ø"/>
+            </a:pPr>
+            <a:r>
+              <a:rPr lang="en-GB" sz="2000" dirty="0" err="1" smtClean="0"/>
+              <a:t>Mitali</a:t>
+            </a:r>
+            <a:r>
+              <a:rPr lang="en-GB" sz="2000" dirty="0" smtClean="0"/>
+              <a:t> and Lilian would usually change between front-end and back-end tasks</a:t>
+            </a:r>
+            <a:endParaRPr lang="en-GB" sz="2000" dirty="0"/>
+          </a:p>
+        </p:txBody>
+      </p:sp>
+    </p:spTree>
+    <p:extLst>
+      <p:ext uri="{BB962C8B-B14F-4D97-AF65-F5344CB8AC3E}">
+        <p14:creationId xmlns:p14="http://schemas.microsoft.com/office/powerpoint/2010/main" val="3287765934"/>
+      </p:ext>
+    </p:extLst>
+  </p:cSld>
+  <p:clrMapOvr>
+    <a:masterClrMapping/>
+  </p:clrMapOvr>
+</p:sld>
+</file>
+
+<file path=ppt/slides/slide27.xml><?xml version="1.0" encoding="utf-8"?>
+<p:sld xmlns:a="http://schemas.openxmlformats.org/drawingml/2006/main" xmlns:r="http://schemas.openxmlformats.org/officeDocument/2006/relationships" xmlns:p="http://schemas.openxmlformats.org/presentationml/2006/main">
+  <p:cSld>
+    <p:spTree>
+      <p:nvGrpSpPr>
+        <p:cNvPr id="1" name=""/>
+        <p:cNvGrpSpPr/>
+        <p:nvPr/>
+      </p:nvGrpSpPr>
+      <p:grpSpPr>
+        <a:xfrm>
+          <a:off x="0" y="0"/>
+          <a:ext cx="0" cy="0"/>
+          <a:chOff x="0" y="0"/>
+          <a:chExt cx="0" cy="0"/>
+        </a:xfrm>
+      </p:grpSpPr>
+      <p:sp>
+        <p:nvSpPr>
+          <p:cNvPr id="2" name="Title 1"/>
+          <p:cNvSpPr>
+            <a:spLocks noGrp="1"/>
+          </p:cNvSpPr>
+          <p:nvPr>
+            <p:ph type="title"/>
+          </p:nvPr>
+        </p:nvSpPr>
+        <p:spPr/>
+        <p:txBody>
+          <a:bodyPr/>
+          <a:lstStyle/>
+          <a:p>
+            <a:r>
+              <a:rPr lang="en-GB" dirty="0" smtClean="0"/>
+              <a:t>Punctuality is important</a:t>
+            </a:r>
+            <a:endParaRPr lang="en-GB" dirty="0"/>
+          </a:p>
+        </p:txBody>
+      </p:sp>
+      <p:sp>
+        <p:nvSpPr>
+          <p:cNvPr id="3" name="Content Placeholder 2"/>
+          <p:cNvSpPr>
+            <a:spLocks noGrp="1"/>
+          </p:cNvSpPr>
+          <p:nvPr>
+            <p:ph idx="1"/>
+          </p:nvPr>
+        </p:nvSpPr>
+        <p:spPr>
+          <a:xfrm>
+            <a:off x="1097280" y="1845734"/>
+            <a:ext cx="10058400" cy="4023360"/>
+          </a:xfrm>
+        </p:spPr>
+        <p:txBody>
+          <a:bodyPr>
+            <a:normAutofit/>
+          </a:bodyPr>
+          <a:lstStyle/>
+          <a:p>
+            <a:pPr lvl="1" fontAlgn="base">
+              <a:buFont typeface="Arial" panose="020B0604020202020204" pitchFamily="34" charset="0"/>
+              <a:buChar char="•"/>
+            </a:pPr>
+            <a:r>
+              <a:rPr lang="en-GB" sz="2400" dirty="0"/>
+              <a:t>By December 19</a:t>
+            </a:r>
+            <a:r>
+              <a:rPr lang="en-GB" sz="2400" baseline="30000" dirty="0"/>
+              <a:t>th</a:t>
+            </a:r>
+            <a:r>
+              <a:rPr lang="en-GB" sz="2400" dirty="0"/>
+              <a:t> </a:t>
+            </a:r>
+            <a:r>
+              <a:rPr lang="en-GB" sz="2400" dirty="0" smtClean="0"/>
+              <a:t>	- make the </a:t>
+            </a:r>
+            <a:r>
+              <a:rPr lang="en-GB" sz="2400" dirty="0"/>
+              <a:t>index pages, the login and register </a:t>
+            </a:r>
+            <a:r>
+              <a:rPr lang="en-GB" sz="2400" dirty="0" smtClean="0"/>
+              <a:t>scripts</a:t>
+            </a:r>
+          </a:p>
+          <a:p>
+            <a:pPr lvl="1" fontAlgn="base">
+              <a:buFont typeface="Arial" panose="020B0604020202020204" pitchFamily="34" charset="0"/>
+              <a:buChar char="•"/>
+            </a:pPr>
+            <a:r>
+              <a:rPr lang="en-GB" sz="2400" dirty="0" smtClean="0"/>
+              <a:t>By </a:t>
+            </a:r>
+            <a:r>
+              <a:rPr lang="en-GB" sz="2400" dirty="0"/>
+              <a:t>13</a:t>
+            </a:r>
+            <a:r>
+              <a:rPr lang="en-GB" sz="2400" baseline="30000" dirty="0"/>
+              <a:t>th</a:t>
+            </a:r>
+            <a:r>
+              <a:rPr lang="en-GB" sz="2400" dirty="0"/>
+              <a:t> January </a:t>
+            </a:r>
+            <a:r>
+              <a:rPr lang="en-GB" sz="2400" dirty="0" smtClean="0"/>
+              <a:t>	- people </a:t>
+            </a:r>
+            <a:r>
+              <a:rPr lang="en-GB" sz="2400" dirty="0"/>
+              <a:t>will have increased their knowledge </a:t>
+            </a:r>
+            <a:r>
+              <a:rPr lang="en-GB" sz="2400" dirty="0" smtClean="0"/>
+              <a:t>(over break)</a:t>
+            </a:r>
+          </a:p>
+          <a:p>
+            <a:pPr lvl="1" fontAlgn="base">
+              <a:buFont typeface="Arial" panose="020B0604020202020204" pitchFamily="34" charset="0"/>
+              <a:buChar char="•"/>
+            </a:pPr>
+            <a:r>
+              <a:rPr lang="en-GB" sz="2400" dirty="0" smtClean="0"/>
+              <a:t>By </a:t>
+            </a:r>
+            <a:r>
+              <a:rPr lang="en-GB" sz="2400" dirty="0"/>
+              <a:t>29</a:t>
+            </a:r>
+            <a:r>
+              <a:rPr lang="en-GB" sz="2400" baseline="30000" dirty="0"/>
+              <a:t>th</a:t>
+            </a:r>
+            <a:r>
+              <a:rPr lang="en-GB" sz="2400" dirty="0"/>
+              <a:t> </a:t>
+            </a:r>
+            <a:r>
+              <a:rPr lang="en-GB" sz="2400" dirty="0" smtClean="0"/>
+              <a:t>January 	- create </a:t>
+            </a:r>
+            <a:r>
+              <a:rPr lang="en-GB" sz="2400" dirty="0"/>
+              <a:t>the user </a:t>
+            </a:r>
+            <a:r>
+              <a:rPr lang="en-GB" sz="2400" dirty="0" smtClean="0"/>
+              <a:t>profiles</a:t>
+            </a:r>
+            <a:endParaRPr lang="en-GB" sz="2400" dirty="0"/>
+          </a:p>
+          <a:p>
+            <a:pPr lvl="1" fontAlgn="base">
+              <a:buFont typeface="Arial" panose="020B0604020202020204" pitchFamily="34" charset="0"/>
+              <a:buChar char="•"/>
+            </a:pPr>
+            <a:r>
+              <a:rPr lang="en-GB" sz="2400" dirty="0"/>
+              <a:t>By 12</a:t>
+            </a:r>
+            <a:r>
+              <a:rPr lang="en-GB" sz="2400" baseline="30000" dirty="0"/>
+              <a:t>th</a:t>
+            </a:r>
+            <a:r>
+              <a:rPr lang="en-GB" sz="2400" dirty="0"/>
+              <a:t> </a:t>
+            </a:r>
+            <a:r>
+              <a:rPr lang="en-GB" sz="2400" dirty="0" smtClean="0"/>
+              <a:t>February	- implement </a:t>
+            </a:r>
+            <a:r>
+              <a:rPr lang="en-GB" sz="2400" dirty="0"/>
+              <a:t>the accommodation </a:t>
+            </a:r>
+            <a:r>
+              <a:rPr lang="en-GB" sz="2400" dirty="0" smtClean="0"/>
+              <a:t>reviews</a:t>
+            </a:r>
+            <a:endParaRPr lang="en-GB" sz="2400" dirty="0"/>
+          </a:p>
+          <a:p>
+            <a:pPr lvl="1" fontAlgn="base">
+              <a:buFont typeface="Arial" panose="020B0604020202020204" pitchFamily="34" charset="0"/>
+              <a:buChar char="•"/>
+            </a:pPr>
+            <a:r>
+              <a:rPr lang="en-GB" sz="2400" dirty="0"/>
+              <a:t>By 19</a:t>
+            </a:r>
+            <a:r>
+              <a:rPr lang="en-GB" sz="2400" baseline="30000" dirty="0"/>
+              <a:t>th</a:t>
+            </a:r>
+            <a:r>
+              <a:rPr lang="en-GB" sz="2400" dirty="0"/>
+              <a:t> </a:t>
+            </a:r>
+            <a:r>
+              <a:rPr lang="en-GB" sz="2400" dirty="0" smtClean="0"/>
+              <a:t>February	- implement </a:t>
+            </a:r>
+            <a:r>
+              <a:rPr lang="en-GB" sz="2400" dirty="0"/>
+              <a:t>the room-mate matching system. </a:t>
+            </a:r>
+          </a:p>
+          <a:p>
+            <a:pPr lvl="1" fontAlgn="base">
+              <a:buFont typeface="Arial" panose="020B0604020202020204" pitchFamily="34" charset="0"/>
+              <a:buChar char="•"/>
+            </a:pPr>
+            <a:r>
+              <a:rPr lang="en-GB" sz="2400" dirty="0"/>
+              <a:t>By 5</a:t>
+            </a:r>
+            <a:r>
+              <a:rPr lang="en-GB" sz="2400" baseline="30000" dirty="0"/>
+              <a:t>th</a:t>
+            </a:r>
+            <a:r>
+              <a:rPr lang="en-GB" sz="2400" dirty="0"/>
+              <a:t> </a:t>
+            </a:r>
+            <a:r>
+              <a:rPr lang="en-GB" sz="2400" dirty="0" smtClean="0"/>
+              <a:t>  March	- implement </a:t>
+            </a:r>
+            <a:r>
+              <a:rPr lang="en-GB" sz="2400" dirty="0"/>
+              <a:t>the Instant Messaging system. </a:t>
+            </a:r>
+            <a:endParaRPr lang="en-GB" sz="2400" dirty="0" smtClean="0"/>
+          </a:p>
+          <a:p>
+            <a:pPr lvl="1" fontAlgn="base">
+              <a:buFont typeface="Arial" panose="020B0604020202020204" pitchFamily="34" charset="0"/>
+              <a:buChar char="•"/>
+            </a:pPr>
+            <a:r>
+              <a:rPr lang="en-GB" sz="2400" dirty="0" smtClean="0"/>
+              <a:t>By 12</a:t>
+            </a:r>
+            <a:r>
+              <a:rPr lang="en-GB" sz="2400" baseline="30000" dirty="0" smtClean="0"/>
+              <a:t>th</a:t>
+            </a:r>
+            <a:r>
+              <a:rPr lang="en-GB" sz="2400" dirty="0" smtClean="0"/>
+              <a:t> March	- finish all retouching/improving and begin heavy testing</a:t>
+            </a:r>
+            <a:endParaRPr lang="en-GB" sz="2400" dirty="0"/>
+          </a:p>
+          <a:p>
+            <a:pPr lvl="1" fontAlgn="base">
+              <a:buFont typeface="Arial" panose="020B0604020202020204" pitchFamily="34" charset="0"/>
+              <a:buChar char="•"/>
+            </a:pPr>
+            <a:r>
+              <a:rPr lang="en-GB" sz="2400" dirty="0"/>
+              <a:t>If we had more time, we would hope to implement a caching </a:t>
+            </a:r>
+            <a:r>
+              <a:rPr lang="en-GB" sz="2400" dirty="0" smtClean="0"/>
+              <a:t>system, </a:t>
+            </a:r>
+            <a:r>
+              <a:rPr lang="en-GB" sz="2400" dirty="0"/>
+              <a:t>for easing the server load. </a:t>
+            </a:r>
+          </a:p>
+        </p:txBody>
+      </p:sp>
+    </p:spTree>
+    <p:extLst>
+      <p:ext uri="{BB962C8B-B14F-4D97-AF65-F5344CB8AC3E}">
+        <p14:creationId xmlns:p14="http://schemas.microsoft.com/office/powerpoint/2010/main" val="1863451399"/>
+      </p:ext>
+    </p:extLst>
+  </p:cSld>
+  <p:clrMapOvr>
+    <a:masterClrMapping/>
+  </p:clrMapOvr>
+</p:sld>
+</file>
+
+<file path=ppt/slides/slide28.xml><?xml version="1.0" encoding="utf-8"?>
+<p:sld xmlns:a="http://schemas.openxmlformats.org/drawingml/2006/main" xmlns:r="http://schemas.openxmlformats.org/officeDocument/2006/relationships" xmlns:p="http://schemas.openxmlformats.org/presentationml/2006/main">
+  <p:cSld>
+    <p:spTree>
+      <p:nvGrpSpPr>
+        <p:cNvPr id="1" name=""/>
+        <p:cNvGrpSpPr/>
+        <p:nvPr/>
+      </p:nvGrpSpPr>
+      <p:grpSpPr>
+        <a:xfrm>
+          <a:off x="0" y="0"/>
+          <a:ext cx="0" cy="0"/>
+          <a:chOff x="0" y="0"/>
+          <a:chExt cx="0" cy="0"/>
+        </a:xfrm>
+      </p:grpSpPr>
+      <p:sp>
+        <p:nvSpPr>
+          <p:cNvPr id="2" name="Title 1"/>
+          <p:cNvSpPr>
+            <a:spLocks noGrp="1"/>
+          </p:cNvSpPr>
+          <p:nvPr>
+            <p:ph type="title"/>
+          </p:nvPr>
+        </p:nvSpPr>
+        <p:spPr/>
+        <p:txBody>
+          <a:bodyPr/>
+          <a:lstStyle/>
+          <a:p>
+            <a:r>
+              <a:rPr lang="en-GB" dirty="0" smtClean="0"/>
+              <a:t>Will put </a:t>
+            </a:r>
+            <a:r>
+              <a:rPr lang="en-GB" dirty="0" err="1" smtClean="0"/>
+              <a:t>gantt</a:t>
+            </a:r>
+            <a:r>
+              <a:rPr lang="en-GB" dirty="0" smtClean="0"/>
+              <a:t> chart</a:t>
+            </a:r>
+            <a:endParaRPr lang="en-GB" dirty="0"/>
+          </a:p>
+        </p:txBody>
+      </p:sp>
+    </p:spTree>
+    <p:extLst>
+      <p:ext uri="{BB962C8B-B14F-4D97-AF65-F5344CB8AC3E}">
+        <p14:creationId xmlns:p14="http://schemas.microsoft.com/office/powerpoint/2010/main" val="3585494328"/>
+      </p:ext>
+    </p:extLst>
+  </p:cSld>
+  <p:clrMapOvr>
+    <a:masterClrMapping/>
+  </p:clrMapOvr>
+</p:sld>
+</file>
+
+<file path=ppt/slides/slide29.xml><?xml version="1.0" encoding="utf-8"?>
+<p:sld xmlns:a="http://schemas.openxmlformats.org/drawingml/2006/main" xmlns:r="http://schemas.openxmlformats.org/officeDocument/2006/relationships" xmlns:p="http://schemas.openxmlformats.org/presentationml/2006/main">
+  <p:cSld>
+    <p:spTree>
+      <p:nvGrpSpPr>
+        <p:cNvPr id="1" name=""/>
+        <p:cNvGrpSpPr/>
+        <p:nvPr/>
+      </p:nvGrpSpPr>
+      <p:grpSpPr>
+        <a:xfrm>
+          <a:off x="0" y="0"/>
+          <a:ext cx="0" cy="0"/>
+          <a:chOff x="0" y="0"/>
+          <a:chExt cx="0" cy="0"/>
+        </a:xfrm>
+      </p:grpSpPr>
+      <p:sp>
+        <p:nvSpPr>
           <p:cNvPr id="2" name=" 1"/>
           <p:cNvSpPr txBox="1">
             <a:spLocks noGrp="1"/>
           </p:cNvSpPr>
           <p:nvPr>
-            <p:ph type="title" idx="4294967295"/>
-          </p:nvPr>
-        </p:nvSpPr>
-        <p:spPr>
-          <a:xfrm>
-            <a:off x="1097280" y="1017163"/>
-            <a:ext cx="10058400" cy="720197"/>
-          </a:xfrm>
-        </p:spPr>
+            <p:ph type="title"/>
+          </p:nvPr>
+        </p:nvSpPr>
+        <p:spPr/>
         <p:txBody>
           <a:bodyPr>
             <a:spAutoFit/>
@@ -11914,7 +13353,7 @@
           <a:p>
             <a:pPr lvl="0"/>
             <a:r>
-              <a:rPr lang="en-GB"/>
+              <a:rPr lang="en-GB" dirty="0"/>
               <a:t>Overview on legal and ethical aspects</a:t>
             </a:r>
           </a:p>
@@ -11932,8 +13371,8 @@
         </p:nvSpPr>
         <p:spPr>
           <a:xfrm>
-            <a:off x="1097280" y="2987945"/>
-            <a:ext cx="10058400" cy="1738938"/>
+            <a:off x="1097280" y="2124573"/>
+            <a:ext cx="10058400" cy="1840504"/>
           </a:xfrm>
         </p:spPr>
         <p:txBody>
@@ -11942,32 +13381,75 @@
           </a:bodyPr>
           <a:lstStyle/>
           <a:p>
-            <a:pPr lvl="0" algn="ctr"/>
-            <a:r>
-              <a:rPr lang="en-GB"/>
-              <a:t>* instant messaging</a:t>
-            </a:r>
-          </a:p>
-          <a:p>
-            <a:pPr lvl="0" algn="ctr"/>
-            <a:r>
-              <a:rPr lang="en-GB"/>
-              <a:t>* religion compatibility</a:t>
-            </a:r>
-          </a:p>
-          <a:p>
-            <a:pPr lvl="0" algn="ctr"/>
-            <a:r>
-              <a:rPr lang="en-GB"/>
-              <a:t>* personal informations confidentiality</a:t>
-            </a:r>
-          </a:p>
-          <a:p>
-            <a:pPr lvl="0" algn="ctr"/>
-            <a:r>
-              <a:rPr lang="en-GB"/>
-              <a:t>* the user reviews</a:t>
-            </a:r>
+            <a:pPr lvl="1">
+              <a:buFont typeface="Arial" panose="020B0604020202020204" pitchFamily="34" charset="0"/>
+              <a:buChar char="•"/>
+            </a:pPr>
+            <a:r>
+              <a:rPr lang="en-GB" sz="2400" dirty="0" smtClean="0"/>
+              <a:t>Some potential issues regarding privacy/ethical/legal matters are</a:t>
+            </a:r>
+          </a:p>
+          <a:p>
+            <a:pPr lvl="2">
+              <a:buFont typeface="Arial" panose="020B0604020202020204" pitchFamily="34" charset="0"/>
+              <a:buChar char="•"/>
+            </a:pPr>
+            <a:r>
+              <a:rPr lang="en-GB" sz="2000" dirty="0" smtClean="0"/>
+              <a:t>I</a:t>
+            </a:r>
+            <a:r>
+              <a:rPr lang="en-GB" sz="2000" dirty="0" smtClean="0"/>
+              <a:t>nstant </a:t>
+            </a:r>
+            <a:r>
+              <a:rPr lang="en-GB" sz="2000" dirty="0"/>
+              <a:t>messaging</a:t>
+            </a:r>
+          </a:p>
+          <a:p>
+            <a:pPr lvl="2">
+              <a:buFont typeface="Arial" panose="020B0604020202020204" pitchFamily="34" charset="0"/>
+              <a:buChar char="•"/>
+            </a:pPr>
+            <a:r>
+              <a:rPr lang="en-GB" sz="2000" dirty="0" smtClean="0"/>
+              <a:t>Religious beliefs</a:t>
+            </a:r>
+            <a:r>
+              <a:rPr lang="en-GB" sz="2000" dirty="0" smtClean="0"/>
+              <a:t> compatibility</a:t>
+            </a:r>
+          </a:p>
+          <a:p>
+            <a:pPr lvl="2">
+              <a:buFont typeface="Arial" panose="020B0604020202020204" pitchFamily="34" charset="0"/>
+              <a:buChar char="•"/>
+            </a:pPr>
+            <a:r>
+              <a:rPr lang="en-GB" sz="2000" dirty="0"/>
+              <a:t>P</a:t>
+            </a:r>
+            <a:r>
+              <a:rPr lang="en-GB" sz="2000" dirty="0" smtClean="0"/>
+              <a:t>ersonal information confidentiality</a:t>
+            </a:r>
+          </a:p>
+          <a:p>
+            <a:pPr lvl="2">
+              <a:buFont typeface="Arial" panose="020B0604020202020204" pitchFamily="34" charset="0"/>
+              <a:buChar char="•"/>
+            </a:pPr>
+            <a:r>
+              <a:rPr lang="en-GB" sz="2000" dirty="0"/>
+              <a:t>T</a:t>
+            </a:r>
+            <a:r>
+              <a:rPr lang="en-GB" sz="2000" dirty="0" smtClean="0"/>
+              <a:t>he user reviews</a:t>
+            </a:r>
+            <a:endParaRPr lang="en-GB" sz="2000" dirty="0"/>
           </a:p>
         </p:txBody>
       </p:sp>
@@ -11999,7 +13481,7 @@
 </p:sld>
 </file>
 
-<file path=ppt/slides/slide24.xml><?xml version="1.0" encoding="utf-8"?>
+<file path=ppt/slides/slide3.xml><?xml version="1.0" encoding="utf-8"?>
 <p:sld xmlns:a="http://schemas.openxmlformats.org/drawingml/2006/main" xmlns:r="http://schemas.openxmlformats.org/officeDocument/2006/relationships" xmlns:p="http://schemas.openxmlformats.org/presentationml/2006/main">
   <p:cSld>
     <p:spTree>
@@ -12018,12 +13500,170 @@
       </p:grpSpPr>
       <p:sp>
         <p:nvSpPr>
+          <p:cNvPr id="2" name="Title 1"/>
+          <p:cNvSpPr>
+            <a:spLocks noGrp="1"/>
+          </p:cNvSpPr>
+          <p:nvPr>
+            <p:ph type="title"/>
+          </p:nvPr>
+        </p:nvSpPr>
+        <p:spPr/>
+        <p:txBody>
+          <a:bodyPr/>
+          <a:lstStyle/>
+          <a:p>
+            <a:r>
+              <a:rPr lang="en-GB" dirty="0" smtClean="0"/>
+              <a:t>What it does</a:t>
+            </a:r>
+            <a:endParaRPr lang="en-GB" dirty="0"/>
+          </a:p>
+        </p:txBody>
+      </p:sp>
+      <p:sp>
+        <p:nvSpPr>
+          <p:cNvPr id="3" name="Content Placeholder 2"/>
+          <p:cNvSpPr>
+            <a:spLocks noGrp="1"/>
+          </p:cNvSpPr>
+          <p:nvPr>
+            <p:ph idx="1"/>
+          </p:nvPr>
+        </p:nvSpPr>
+        <p:spPr/>
+        <p:txBody>
+          <a:bodyPr>
+            <a:normAutofit/>
+          </a:bodyPr>
+          <a:lstStyle/>
+          <a:p>
+            <a:pPr lvl="1">
+              <a:buFont typeface="Arial" panose="020B0604020202020204" pitchFamily="34" charset="0"/>
+              <a:buChar char="•"/>
+            </a:pPr>
+            <a:r>
+              <a:rPr lang="en-GB" sz="2400" dirty="0" smtClean="0"/>
+              <a:t>Checks compatibility of users</a:t>
+            </a:r>
+          </a:p>
+          <a:p>
+            <a:pPr marL="292608" lvl="1" indent="0">
+              <a:buNone/>
+            </a:pPr>
+            <a:r>
+              <a:rPr lang="en-GB" sz="2400" dirty="0"/>
+              <a:t>	</a:t>
+            </a:r>
+            <a:r>
+              <a:rPr lang="en-GB" sz="2400" dirty="0" smtClean="0"/>
+              <a:t>…based on their profiles.</a:t>
+            </a:r>
+          </a:p>
+          <a:p>
+            <a:pPr lvl="1">
+              <a:buFont typeface="Arial" panose="020B0604020202020204" pitchFamily="34" charset="0"/>
+              <a:buChar char="•"/>
+            </a:pPr>
+            <a:r>
+              <a:rPr lang="en-GB" sz="2400" dirty="0" smtClean="0"/>
+              <a:t>Suggests them to each other.</a:t>
+            </a:r>
+          </a:p>
+          <a:p>
+            <a:pPr lvl="1">
+              <a:buFont typeface="Arial" panose="020B0604020202020204" pitchFamily="34" charset="0"/>
+              <a:buChar char="•"/>
+            </a:pPr>
+            <a:r>
+              <a:rPr lang="en-GB" sz="2400" dirty="0" smtClean="0"/>
+              <a:t>They add each other.</a:t>
+            </a:r>
+          </a:p>
+          <a:p>
+            <a:pPr lvl="1">
+              <a:buFont typeface="Arial" panose="020B0604020202020204" pitchFamily="34" charset="0"/>
+              <a:buChar char="•"/>
+            </a:pPr>
+            <a:r>
+              <a:rPr lang="en-GB" sz="2400" dirty="0" smtClean="0"/>
+              <a:t>They become friends.</a:t>
+            </a:r>
+          </a:p>
+          <a:p>
+            <a:pPr lvl="1">
+              <a:buFont typeface="Arial" panose="020B0604020202020204" pitchFamily="34" charset="0"/>
+              <a:buChar char="•"/>
+            </a:pPr>
+            <a:r>
+              <a:rPr lang="en-GB" sz="2400" dirty="0" smtClean="0"/>
+              <a:t>They become room-mates.</a:t>
+            </a:r>
+          </a:p>
+          <a:p>
+            <a:pPr lvl="1">
+              <a:buFont typeface="Arial" panose="020B0604020202020204" pitchFamily="34" charset="0"/>
+              <a:buChar char="•"/>
+            </a:pPr>
+            <a:r>
+              <a:rPr lang="en-GB" sz="2400" dirty="0" smtClean="0"/>
+              <a:t> </a:t>
+            </a:r>
+            <a:r>
+              <a:rPr lang="en-GB" sz="2400" strike="sngStrike" dirty="0" smtClean="0"/>
+              <a:t>And they all live happily ever after.</a:t>
+            </a:r>
+          </a:p>
+        </p:txBody>
+      </p:sp>
+    </p:spTree>
+    <p:extLst>
+      <p:ext uri="{BB962C8B-B14F-4D97-AF65-F5344CB8AC3E}">
+        <p14:creationId xmlns:p14="http://schemas.microsoft.com/office/powerpoint/2010/main" val="3039609042"/>
+      </p:ext>
+    </p:extLst>
+  </p:cSld>
+  <p:clrMapOvr>
+    <a:masterClrMapping/>
+  </p:clrMapOvr>
+  <p:transition spd="slow">
+    <p:push/>
+  </p:transition>
+  <p:timing>
+    <p:tnLst>
+      <p:par>
+        <p:cTn id="1" dur="indefinite" restart="never" nodeType="tmRoot"/>
+      </p:par>
+    </p:tnLst>
+  </p:timing>
+</p:sld>
+</file>
+
+<file path=ppt/slides/slide30.xml><?xml version="1.0" encoding="utf-8"?>
+<p:sld xmlns:a="http://schemas.openxmlformats.org/drawingml/2006/main" xmlns:r="http://schemas.openxmlformats.org/officeDocument/2006/relationships" xmlns:p="http://schemas.openxmlformats.org/presentationml/2006/main">
+  <p:cSld>
+    <p:spTree>
+      <p:nvGrpSpPr>
+        <p:cNvPr id="1" name=""/>
+        <p:cNvGrpSpPr/>
+        <p:nvPr/>
+      </p:nvGrpSpPr>
+      <p:grpSpPr>
+        <a:xfrm>
+          <a:off x="0" y="0"/>
+          <a:ext cx="0" cy="0"/>
+          <a:chOff x="0" y="0"/>
+          <a:chExt cx="0" cy="0"/>
+        </a:xfrm>
+      </p:grpSpPr>
+      <p:sp>
+        <p:nvSpPr>
           <p:cNvPr id="2" name=" 1"/>
           <p:cNvSpPr txBox="1">
             <a:spLocks noGrp="1"/>
           </p:cNvSpPr>
           <p:nvPr>
-            <p:ph type="title" idx="4294967295"/>
+            <p:ph type="title"/>
           </p:nvPr>
         </p:nvSpPr>
         <p:spPr/>
@@ -12049,31 +13689,63 @@
             <p:ph type="body" idx="4294967295"/>
           </p:nvPr>
         </p:nvSpPr>
-        <p:spPr/>
-        <p:txBody>
-          <a:bodyPr/>
-          <a:lstStyle/>
-          <a:p>
-            <a:pPr lvl="0">
+        <p:spPr>
+          <a:xfrm>
+            <a:off x="1097280" y="1947863"/>
+            <a:ext cx="10058400" cy="4022725"/>
+          </a:xfrm>
+        </p:spPr>
+        <p:txBody>
+          <a:bodyPr>
+            <a:normAutofit/>
+          </a:bodyPr>
+          <a:lstStyle/>
+          <a:p>
+            <a:pPr lvl="1">
+              <a:buFont typeface="Arial" panose="020B0604020202020204" pitchFamily="34" charset="0"/>
+              <a:buChar char="•"/>
+            </a:pPr>
+            <a:r>
+              <a:rPr lang="en-GB" sz="2400" dirty="0" smtClean="0"/>
+              <a:t>Warn users not to use the chat for sensible content</a:t>
+            </a:r>
+          </a:p>
+          <a:p>
+            <a:pPr lvl="1">
+              <a:buFont typeface="Arial" panose="020B0604020202020204" pitchFamily="34" charset="0"/>
+              <a:buChar char="•"/>
+            </a:pPr>
+            <a:r>
+              <a:rPr lang="en-GB" sz="2400" dirty="0" smtClean="0"/>
+              <a:t>Notice users about any potential use of their information, such as in legal matters</a:t>
+            </a:r>
+          </a:p>
+          <a:p>
+            <a:pPr lvl="1">
+              <a:buFont typeface="Arial" panose="020B0604020202020204" pitchFamily="34" charset="0"/>
+              <a:buChar char="•"/>
+            </a:pPr>
+            <a:r>
+              <a:rPr lang="en-GB" sz="2400" dirty="0" smtClean="0"/>
+              <a:t>Assure them that we will not give their information to third parties (public)</a:t>
+            </a:r>
+          </a:p>
+          <a:p>
+            <a:pPr marL="384048" lvl="2" indent="0">
+              <a:buNone/>
+            </a:pPr>
+            <a:r>
+              <a:rPr lang="en-GB" sz="2000" dirty="0" smtClean="0"/>
+              <a:t>  (except the legal matters, when required)</a:t>
+            </a:r>
+            <a:endParaRPr lang="en-GB" sz="2000" dirty="0"/>
+          </a:p>
+          <a:p>
+            <a:pPr marL="0" lvl="0" indent="0">
               <a:buSzPct val="45000"/>
-              <a:buFont typeface="StarSymbol"/>
-              <a:buChar char="●"/>
+              <a:buNone/>
             </a:pPr>
-            <a:r>
-              <a:rPr lang="en-GB"/>
-              <a:t>The users have to be aware that the messages they are sending and receiving are not private, meaning they are ran through our software</a:t>
-            </a:r>
-          </a:p>
-          <a:p>
-            <a:pPr lvl="0">
-              <a:buSzPct val="45000"/>
-              <a:buFont typeface="StarSymbol"/>
-              <a:buChar char="●"/>
-            </a:pPr>
-            <a:r>
-              <a:rPr lang="en-GB"/>
-              <a:t>This does not mean they will ever be made public</a:t>
-            </a:r>
+            <a:endParaRPr lang="en-GB" dirty="0" smtClean="0"/>
           </a:p>
         </p:txBody>
       </p:sp>
@@ -12105,7 +13777,7 @@
 </p:sld>
 </file>
 
-<file path=ppt/slides/slide25.xml><?xml version="1.0" encoding="utf-8"?>
+<file path=ppt/slides/slide31.xml><?xml version="1.0" encoding="utf-8"?>
 <p:sld xmlns:a="http://schemas.openxmlformats.org/drawingml/2006/main" xmlns:r="http://schemas.openxmlformats.org/officeDocument/2006/relationships" xmlns:p="http://schemas.openxmlformats.org/presentationml/2006/main">
   <p:cSld>
     <p:spTree>
@@ -12129,7 +13801,7 @@
             <a:spLocks noGrp="1"/>
           </p:cNvSpPr>
           <p:nvPr>
-            <p:ph type="title" idx="4294967295"/>
+            <p:ph type="title"/>
           </p:nvPr>
         </p:nvSpPr>
         <p:spPr/>
@@ -12139,8 +13811,12 @@
           <a:p>
             <a:pPr lvl="0"/>
             <a:r>
-              <a:rPr lang="en-GB"/>
-              <a:t>Religion compatibility</a:t>
+              <a:rPr lang="en-GB" dirty="0" smtClean="0"/>
+              <a:t>Religious beliefs </a:t>
+            </a:r>
+            <a:r>
+              <a:rPr lang="en-GB" dirty="0"/>
+              <a:t>compatibility</a:t>
             </a:r>
           </a:p>
         </p:txBody>
@@ -12155,20 +13831,54 @@
             <p:ph type="body" idx="4294967295"/>
           </p:nvPr>
         </p:nvSpPr>
-        <p:spPr/>
-        <p:txBody>
-          <a:bodyPr/>
-          <a:lstStyle/>
-          <a:p>
-            <a:pPr lvl="0">
-              <a:buSzPct val="45000"/>
-              <a:buFont typeface="StarSymbol"/>
-              <a:buChar char="●"/>
+        <p:spPr>
+          <a:xfrm>
+            <a:off x="1097280" y="2032000"/>
+            <a:ext cx="10058400" cy="3951288"/>
+          </a:xfrm>
+        </p:spPr>
+        <p:txBody>
+          <a:bodyPr>
+            <a:normAutofit/>
+          </a:bodyPr>
+          <a:lstStyle/>
+          <a:p>
+            <a:pPr lvl="1">
+              <a:buSzPct val="100000"/>
+              <a:buFont typeface="Arial" panose="020B0604020202020204" pitchFamily="34" charset="0"/>
+              <a:buChar char="•"/>
             </a:pPr>
             <a:r>
-              <a:rPr lang="en-GB"/>
-              <a:t>We had some issues with this aspect of our project because people have different views over the religious beliefs and this can (and in some cases will) lead to conflict between the tenants</a:t>
-            </a:r>
+              <a:rPr lang="en-GB" sz="2400" dirty="0" smtClean="0"/>
+              <a:t>Lots of different views over the religious beliefs</a:t>
+            </a:r>
+          </a:p>
+          <a:p>
+            <a:pPr lvl="1">
+              <a:buSzPct val="100000"/>
+              <a:buFont typeface="Arial" panose="020B0604020202020204" pitchFamily="34" charset="0"/>
+              <a:buChar char="•"/>
+            </a:pPr>
+            <a:r>
+              <a:rPr lang="en-GB" sz="2400" dirty="0" smtClean="0"/>
+              <a:t>Approaching the matter with high precaution, as this can lead to conflicts</a:t>
+            </a:r>
+          </a:p>
+          <a:p>
+            <a:pPr lvl="1">
+              <a:buSzPct val="100000"/>
+              <a:buFont typeface="Arial" panose="020B0604020202020204" pitchFamily="34" charset="0"/>
+              <a:buChar char="•"/>
+            </a:pPr>
+            <a:r>
+              <a:rPr lang="en-GB" sz="2400" dirty="0" smtClean="0"/>
+              <a:t>Discourage discrimination, by making this kind of </a:t>
+            </a:r>
+            <a:r>
+              <a:rPr lang="en-GB" sz="2400" dirty="0" smtClean="0"/>
+              <a:t>details optional for filtering</a:t>
+            </a:r>
+            <a:endParaRPr lang="en-GB" sz="2400" dirty="0" smtClean="0"/>
           </a:p>
         </p:txBody>
       </p:sp>
@@ -12200,7 +13910,7 @@
 </p:sld>
 </file>
 
-<file path=ppt/slides/slide26.xml><?xml version="1.0" encoding="utf-8"?>
+<file path=ppt/slides/slide32.xml><?xml version="1.0" encoding="utf-8"?>
 <p:sld xmlns:a="http://schemas.openxmlformats.org/drawingml/2006/main" xmlns:r="http://schemas.openxmlformats.org/officeDocument/2006/relationships" xmlns:p="http://schemas.openxmlformats.org/presentationml/2006/main">
   <p:cSld>
     <p:spTree>
@@ -12224,7 +13934,7 @@
             <a:spLocks noGrp="1"/>
           </p:cNvSpPr>
           <p:nvPr>
-            <p:ph type="title" idx="4294967295"/>
+            <p:ph type="title"/>
           </p:nvPr>
         </p:nvSpPr>
         <p:spPr/>
@@ -12234,8 +13944,16 @@
           <a:p>
             <a:pPr lvl="0"/>
             <a:r>
-              <a:rPr lang="en-GB"/>
-              <a:t>Personal informations confidentiality</a:t>
+              <a:rPr lang="en-GB" dirty="0"/>
+              <a:t>Personal </a:t>
+            </a:r>
+            <a:r>
+              <a:rPr lang="en-GB" dirty="0" smtClean="0"/>
+              <a:t>information </a:t>
+            </a:r>
+            <a:r>
+              <a:rPr lang="en-GB" dirty="0"/>
+              <a:t>confidentiality</a:t>
             </a:r>
           </a:p>
         </p:txBody>
@@ -12250,28 +13968,82 @@
             <p:ph type="body" idx="4294967295"/>
           </p:nvPr>
         </p:nvSpPr>
-        <p:spPr/>
-        <p:txBody>
-          <a:bodyPr/>
-          <a:lstStyle/>
+        <p:spPr>
+          <a:xfrm>
+            <a:off x="1097280" y="2049463"/>
+            <a:ext cx="10058400" cy="4022725"/>
+          </a:xfrm>
+        </p:spPr>
+        <p:txBody>
+          <a:bodyPr>
+            <a:normAutofit/>
+          </a:bodyPr>
+          <a:lstStyle/>
+          <a:p>
+            <a:pPr lvl="1">
+              <a:buFont typeface="Arial" panose="020B0604020202020204" pitchFamily="34" charset="0"/>
+              <a:buChar char="•"/>
+            </a:pPr>
+            <a:r>
+              <a:rPr lang="en-GB" sz="2400" dirty="0" smtClean="0"/>
+              <a:t>Character of personal information is public within the website (for registered users)</a:t>
+            </a:r>
+          </a:p>
+          <a:p>
+            <a:pPr lvl="1">
+              <a:buFont typeface="Arial" panose="020B0604020202020204" pitchFamily="34" charset="0"/>
+              <a:buChar char="•"/>
+            </a:pPr>
+            <a:r>
+              <a:rPr lang="en-GB" sz="2400" dirty="0" smtClean="0"/>
+              <a:t>The matching engine uses all the filters and details provided</a:t>
+            </a:r>
+          </a:p>
+          <a:p>
+            <a:pPr lvl="1">
+              <a:buFont typeface="Arial" panose="020B0604020202020204" pitchFamily="34" charset="0"/>
+              <a:buChar char="•"/>
+            </a:pPr>
+            <a:r>
+              <a:rPr lang="en-GB" sz="2400" dirty="0" smtClean="0"/>
+              <a:t>You can see the profile of a user anytime</a:t>
+            </a:r>
+          </a:p>
+          <a:p>
+            <a:pPr marL="384048" lvl="2" indent="0">
+              <a:buNone/>
+            </a:pPr>
+            <a:r>
+              <a:rPr lang="en-GB" sz="2400" dirty="0"/>
+              <a:t> </a:t>
+            </a:r>
+            <a:r>
+              <a:rPr lang="en-GB" sz="2400" dirty="0" smtClean="0"/>
+              <a:t> </a:t>
+            </a:r>
+            <a:r>
+              <a:rPr lang="en-GB" sz="2200" dirty="0" smtClean="0"/>
+              <a:t>but you can see their name just if the accepted your request to connect</a:t>
+            </a:r>
+          </a:p>
+          <a:p>
+            <a:pPr lvl="1">
+              <a:buFont typeface="Arial" panose="020B0604020202020204" pitchFamily="34" charset="0"/>
+              <a:buChar char="•"/>
+            </a:pPr>
+            <a:r>
+              <a:rPr lang="en-GB" sz="2400" dirty="0" smtClean="0"/>
+              <a:t>Unlink the information from the user by hiding their name</a:t>
+            </a:r>
+            <a:endParaRPr lang="en-GB" sz="2400" dirty="0" smtClean="0"/>
+          </a:p>
           <a:p>
             <a:pPr lvl="0">
               <a:buSzPct val="45000"/>
               <a:buFont typeface="StarSymbol"/>
               <a:buChar char="●"/>
             </a:pPr>
-            <a:r>
-              <a:rPr lang="en-GB" dirty="0"/>
-              <a:t>Almost all of the user's personal information will be made public at some point because when </a:t>
-            </a:r>
-            <a:r>
-              <a:rPr lang="en-GB" dirty="0" smtClean="0"/>
-              <a:t>the engine </a:t>
-            </a:r>
-            <a:r>
-              <a:rPr lang="en-GB" dirty="0"/>
-              <a:t>finds a match both users have access to the other person's profile</a:t>
-            </a:r>
+            <a:endParaRPr lang="en-GB" dirty="0"/>
           </a:p>
           <a:p>
             <a:pPr lvl="0">
@@ -12279,18 +14051,15 @@
               <a:buFont typeface="StarSymbol"/>
               <a:buChar char="●"/>
             </a:pPr>
-            <a:r>
-              <a:rPr lang="en-GB" dirty="0"/>
-              <a:t>Only after they have befriended each other the personal </a:t>
-            </a:r>
-            <a:r>
-              <a:rPr lang="en-GB" dirty="0" err="1"/>
-              <a:t>informations</a:t>
-            </a:r>
-            <a:r>
-              <a:rPr lang="en-GB" dirty="0"/>
-              <a:t> is to be made public</a:t>
-            </a:r>
+            <a:endParaRPr lang="en-GB" dirty="0" smtClean="0"/>
+          </a:p>
+          <a:p>
+            <a:pPr lvl="0">
+              <a:buSzPct val="45000"/>
+              <a:buFont typeface="StarSymbol"/>
+              <a:buChar char="●"/>
+            </a:pPr>
+            <a:endParaRPr lang="en-GB" dirty="0"/>
           </a:p>
         </p:txBody>
       </p:sp>
@@ -12322,7 +14091,7 @@
 </p:sld>
 </file>
 
-<file path=ppt/slides/slide27.xml><?xml version="1.0" encoding="utf-8"?>
+<file path=ppt/slides/slide33.xml><?xml version="1.0" encoding="utf-8"?>
 <p:sld xmlns:a="http://schemas.openxmlformats.org/drawingml/2006/main" xmlns:r="http://schemas.openxmlformats.org/officeDocument/2006/relationships" xmlns:p="http://schemas.openxmlformats.org/presentationml/2006/main">
   <p:cSld>
     <p:spTree>
@@ -12346,7 +14115,7 @@
             <a:spLocks noGrp="1"/>
           </p:cNvSpPr>
           <p:nvPr>
-            <p:ph type="title" idx="4294967295"/>
+            <p:ph type="title"/>
           </p:nvPr>
         </p:nvSpPr>
         <p:spPr/>
@@ -12372,31 +14141,68 @@
             <p:ph type="body" idx="4294967295"/>
           </p:nvPr>
         </p:nvSpPr>
-        <p:spPr/>
-        <p:txBody>
-          <a:bodyPr/>
-          <a:lstStyle/>
-          <a:p>
-            <a:pPr lvl="0">
-              <a:buSzPct val="45000"/>
-              <a:buFont typeface="StarSymbol"/>
-              <a:buChar char="●"/>
+        <p:spPr>
+          <a:xfrm>
+            <a:off x="1097280" y="2036763"/>
+            <a:ext cx="10058400" cy="4821237"/>
+          </a:xfrm>
+        </p:spPr>
+        <p:txBody>
+          <a:bodyPr>
+            <a:normAutofit/>
+          </a:bodyPr>
+          <a:lstStyle/>
+          <a:p>
+            <a:pPr lvl="1">
+              <a:buFont typeface="Arial" panose="020B0604020202020204" pitchFamily="34" charset="0"/>
+              <a:buChar char="•"/>
             </a:pPr>
             <a:r>
-              <a:rPr lang="en-GB"/>
-              <a:t>When agreeing to our terms and conditions the user agrees that his review on an accommodation will be made public after being proofread by a member of the staff</a:t>
-            </a:r>
-          </a:p>
-          <a:p>
-            <a:pPr lvl="0">
-              <a:buSzPct val="45000"/>
-              <a:buFont typeface="StarSymbol"/>
-              <a:buChar char="●"/>
+              <a:rPr lang="en-GB" sz="2400" dirty="0" smtClean="0"/>
+              <a:t>Filtering the reviews for sensible content (such as foul language) or spam</a:t>
+            </a:r>
+          </a:p>
+          <a:p>
+            <a:pPr lvl="1">
+              <a:buFont typeface="Arial" panose="020B0604020202020204" pitchFamily="34" charset="0"/>
+              <a:buChar char="•"/>
             </a:pPr>
             <a:r>
-              <a:rPr lang="en-GB"/>
-              <a:t>Main point about this is for the user to understand that his review will appear on the site after being reviewed by the staff to avoid spam, also their name will appear only if they are logged in</a:t>
-            </a:r>
+              <a:rPr lang="en-GB" sz="2400" dirty="0" smtClean="0"/>
+              <a:t>Possible admin filtering some reviews</a:t>
+            </a:r>
+          </a:p>
+          <a:p>
+            <a:pPr lvl="1">
+              <a:buFont typeface="Arial" panose="020B0604020202020204" pitchFamily="34" charset="0"/>
+              <a:buChar char="•"/>
+            </a:pPr>
+            <a:r>
+              <a:rPr lang="en-GB" sz="2400" dirty="0" smtClean="0"/>
+              <a:t>Warn the users about the public character of the reviews they provide</a:t>
+            </a:r>
+            <a:endParaRPr lang="en-GB" sz="2400" dirty="0" smtClean="0"/>
+          </a:p>
+          <a:p>
+            <a:pPr lvl="1">
+              <a:buFont typeface="Arial" panose="020B0604020202020204" pitchFamily="34" charset="0"/>
+              <a:buChar char="•"/>
+            </a:pPr>
+            <a:r>
+              <a:rPr lang="en-GB" sz="2400" dirty="0" smtClean="0"/>
+              <a:t>Their name will be public</a:t>
+            </a:r>
+          </a:p>
+          <a:p>
+            <a:pPr lvl="1">
+              <a:buFont typeface="Arial" panose="020B0604020202020204" pitchFamily="34" charset="0"/>
+              <a:buChar char="•"/>
+            </a:pPr>
+            <a:r>
+              <a:rPr lang="en-GB" sz="2400" dirty="0" smtClean="0"/>
+              <a:t>Their name will not link to their profile (keeping the confidentiality)</a:t>
+            </a:r>
+            <a:endParaRPr lang="en-GB" sz="2400" dirty="0"/>
           </a:p>
         </p:txBody>
       </p:sp>
@@ -12428,7 +14234,7 @@
 </p:sld>
 </file>
 
-<file path=ppt/slides/slide28.xml><?xml version="1.0" encoding="utf-8"?>
+<file path=ppt/slides/slide34.xml><?xml version="1.0" encoding="utf-8"?>
 <p:sld xmlns:a="http://schemas.openxmlformats.org/drawingml/2006/main" xmlns:r="http://schemas.openxmlformats.org/officeDocument/2006/relationships" xmlns:p="http://schemas.openxmlformats.org/presentationml/2006/main">
   <p:cSld>
     <p:spTree>
@@ -12518,185 +14324,6 @@
 </p:sld>
 </file>
 
-<file path=ppt/slides/slide3.xml><?xml version="1.0" encoding="utf-8"?>
-<p:sld xmlns:a="http://schemas.openxmlformats.org/drawingml/2006/main" xmlns:r="http://schemas.openxmlformats.org/officeDocument/2006/relationships" xmlns:p="http://schemas.openxmlformats.org/presentationml/2006/main">
-  <p:cSld>
-    <p:spTree>
-      <p:nvGrpSpPr>
-        <p:cNvPr id="1" name=""/>
-        <p:cNvGrpSpPr/>
-        <p:nvPr/>
-      </p:nvGrpSpPr>
-      <p:grpSpPr>
-        <a:xfrm>
-          <a:off x="0" y="0"/>
-          <a:ext cx="0" cy="0"/>
-          <a:chOff x="0" y="0"/>
-          <a:chExt cx="0" cy="0"/>
-        </a:xfrm>
-      </p:grpSpPr>
-      <p:sp>
-        <p:nvSpPr>
-          <p:cNvPr id="2" name="Title 1"/>
-          <p:cNvSpPr>
-            <a:spLocks noGrp="1"/>
-          </p:cNvSpPr>
-          <p:nvPr>
-            <p:ph type="title"/>
-          </p:nvPr>
-        </p:nvSpPr>
-        <p:spPr/>
-        <p:txBody>
-          <a:bodyPr/>
-          <a:lstStyle/>
-          <a:p>
-            <a:r>
-              <a:rPr lang="en-GB" dirty="0" smtClean="0"/>
-              <a:t>What it does</a:t>
-            </a:r>
-            <a:endParaRPr lang="en-GB" dirty="0"/>
-          </a:p>
-        </p:txBody>
-      </p:sp>
-      <p:sp>
-        <p:nvSpPr>
-          <p:cNvPr id="3" name="Content Placeholder 2"/>
-          <p:cNvSpPr>
-            <a:spLocks noGrp="1"/>
-          </p:cNvSpPr>
-          <p:nvPr>
-            <p:ph idx="1"/>
-          </p:nvPr>
-        </p:nvSpPr>
-        <p:spPr/>
-        <p:txBody>
-          <a:bodyPr>
-            <a:normAutofit/>
-          </a:bodyPr>
-          <a:lstStyle/>
-          <a:p>
-            <a:pPr lvl="1">
-              <a:buFont typeface="Arial" panose="020B0604020202020204" pitchFamily="34" charset="0"/>
-              <a:buChar char="•"/>
-            </a:pPr>
-            <a:r>
-              <a:rPr lang="en-GB" sz="2400" dirty="0" smtClean="0"/>
-              <a:t>Checks compatibility of users</a:t>
-            </a:r>
-          </a:p>
-          <a:p>
-            <a:pPr marL="292608" lvl="1" indent="0">
-              <a:buNone/>
-            </a:pPr>
-            <a:r>
-              <a:rPr lang="en-GB" sz="2400" dirty="0"/>
-              <a:t>	</a:t>
-            </a:r>
-            <a:r>
-              <a:rPr lang="en-GB" sz="2400" dirty="0" smtClean="0"/>
-              <a:t>…based on their profiles.</a:t>
-            </a:r>
-          </a:p>
-          <a:p>
-            <a:pPr lvl="1">
-              <a:buFont typeface="Arial" panose="020B0604020202020204" pitchFamily="34" charset="0"/>
-              <a:buChar char="•"/>
-            </a:pPr>
-            <a:r>
-              <a:rPr lang="en-GB" sz="2400" dirty="0" smtClean="0"/>
-              <a:t>Suggests them to each other.</a:t>
-            </a:r>
-          </a:p>
-          <a:p>
-            <a:pPr lvl="1">
-              <a:buFont typeface="Arial" panose="020B0604020202020204" pitchFamily="34" charset="0"/>
-              <a:buChar char="•"/>
-            </a:pPr>
-            <a:r>
-              <a:rPr lang="en-GB" sz="2400" dirty="0" smtClean="0"/>
-              <a:t>They add each other.</a:t>
-            </a:r>
-          </a:p>
-          <a:p>
-            <a:pPr lvl="1">
-              <a:buFont typeface="Arial" panose="020B0604020202020204" pitchFamily="34" charset="0"/>
-              <a:buChar char="•"/>
-            </a:pPr>
-            <a:r>
-              <a:rPr lang="en-GB" sz="2400" dirty="0" smtClean="0"/>
-              <a:t>They become friends.</a:t>
-            </a:r>
-          </a:p>
-          <a:p>
-            <a:pPr lvl="1">
-              <a:buFont typeface="Arial" panose="020B0604020202020204" pitchFamily="34" charset="0"/>
-              <a:buChar char="•"/>
-            </a:pPr>
-            <a:r>
-              <a:rPr lang="en-GB" sz="2400" dirty="0" smtClean="0"/>
-              <a:t>They become </a:t>
-            </a:r>
-            <a:r>
-              <a:rPr lang="en-GB" sz="2400" dirty="0" smtClean="0"/>
-              <a:t>room-mates.</a:t>
-            </a:r>
-          </a:p>
-          <a:p>
-            <a:pPr lvl="1">
-              <a:buFont typeface="Arial" panose="020B0604020202020204" pitchFamily="34" charset="0"/>
-              <a:buChar char="•"/>
-            </a:pPr>
-            <a:r>
-              <a:rPr lang="en-GB" sz="2400" dirty="0" smtClean="0"/>
-              <a:t> </a:t>
-            </a:r>
-            <a:r>
-              <a:rPr lang="en-GB" sz="2400" strike="sngStrike" dirty="0" smtClean="0"/>
-              <a:t>And </a:t>
-            </a:r>
-            <a:r>
-              <a:rPr lang="en-GB" sz="2400" strike="sngStrike" dirty="0" smtClean="0"/>
-              <a:t>they all </a:t>
-            </a:r>
-            <a:r>
-              <a:rPr lang="en-GB" sz="2400" strike="sngStrike" dirty="0" smtClean="0"/>
-              <a:t>live </a:t>
-            </a:r>
-            <a:r>
-              <a:rPr lang="en-GB" sz="2400" strike="sngStrike" dirty="0" smtClean="0"/>
-              <a:t>happily ever after</a:t>
-            </a:r>
-            <a:r>
-              <a:rPr lang="en-GB" sz="2400" strike="sngStrike" dirty="0" smtClean="0"/>
-              <a:t>.</a:t>
-            </a:r>
-            <a:endParaRPr lang="en-GB" sz="2400" strike="sngStrike" dirty="0" smtClean="0"/>
-          </a:p>
-        </p:txBody>
-      </p:sp>
-    </p:spTree>
-    <p:extLst>
-      <p:ext uri="{BB962C8B-B14F-4D97-AF65-F5344CB8AC3E}">
-        <p14:creationId xmlns:p14="http://schemas.microsoft.com/office/powerpoint/2010/main" val="3039609042"/>
-      </p:ext>
-    </p:extLst>
-  </p:cSld>
-  <p:clrMapOvr>
-    <a:masterClrMapping/>
-  </p:clrMapOvr>
-  <p:transition spd="slow">
-    <p:push/>
-  </p:transition>
-  <p:timing>
-    <p:tnLst>
-      <p:par>
-        <p:cTn id="1" dur="indefinite" restart="never" nodeType="tmRoot"/>
-      </p:par>
-    </p:tnLst>
-  </p:timing>
-</p:sld>
-</file>
-
 <file path=ppt/slides/slide4.xml><?xml version="1.0" encoding="utf-8"?>
 <p:sld xmlns:a="http://schemas.openxmlformats.org/drawingml/2006/main" xmlns:r="http://schemas.openxmlformats.org/officeDocument/2006/relationships" xmlns:p="http://schemas.openxmlformats.org/presentationml/2006/main">
   <p:cSld>
@@ -12787,13 +14414,8 @@
             </a:pPr>
             <a:r>
               <a:rPr lang="en-GB" sz="2400" dirty="0" smtClean="0"/>
-              <a:t>Likes computers</a:t>
-            </a:r>
-            <a:r>
-              <a:rPr lang="en-GB" sz="2400" dirty="0" smtClean="0"/>
-              <a:t>.</a:t>
-            </a:r>
-            <a:endParaRPr lang="en-GB" sz="2400" dirty="0" smtClean="0"/>
+              <a:t>Likes computers.</a:t>
+            </a:r>
           </a:p>
           <a:p>
             <a:pPr lvl="1">
@@ -12812,11 +14434,7 @@
             </a:pPr>
             <a:r>
               <a:rPr lang="en-GB" sz="2400" dirty="0" smtClean="0"/>
-              <a:t>Dislikes tomatoes</a:t>
-            </a:r>
-            <a:r>
-              <a:rPr lang="en-GB" sz="2400" dirty="0" smtClean="0"/>
-              <a:t>.</a:t>
+              <a:t>Dislikes tomatoes.</a:t>
             </a:r>
           </a:p>
           <a:p>
@@ -12828,6 +14446,20 @@
               <a:rPr lang="en-GB" sz="2400" dirty="0" smtClean="0"/>
               <a:t>Etc.</a:t>
             </a:r>
+          </a:p>
+          <a:p>
+            <a:pPr marL="201168" lvl="1" indent="0">
+              <a:buNone/>
+            </a:pPr>
+            <a:endParaRPr lang="en-GB" sz="2400" dirty="0" smtClean="0"/>
+          </a:p>
+          <a:p>
+            <a:pPr marL="201168" lvl="1" indent="0">
+              <a:lnSpc>
+                <a:spcPct val="100000"/>
+              </a:lnSpc>
+              <a:buNone/>
+            </a:pPr>
             <a:endParaRPr lang="en-GB" sz="2400" dirty="0" smtClean="0"/>
           </a:p>
           <a:p>
@@ -12835,60 +14467,63 @@
               <a:buFont typeface="Arial" panose="020B0604020202020204" pitchFamily="34" charset="0"/>
               <a:buChar char="•"/>
             </a:pPr>
-            <a:endParaRPr lang="en-GB" sz="2400" dirty="0" smtClean="0"/>
-          </a:p>
+            <a:r>
+              <a:rPr lang="en-GB" sz="2400" dirty="0" smtClean="0"/>
+              <a:t>Dislikes spiders.</a:t>
+            </a:r>
+            <a:endParaRPr lang="en-GB" sz="2400" dirty="0"/>
+          </a:p>
+        </p:txBody>
+      </p:sp>
+      <p:sp>
+        <p:nvSpPr>
+          <p:cNvPr id="7" name="Text Placeholder 6"/>
+          <p:cNvSpPr>
+            <a:spLocks noGrp="1"/>
+          </p:cNvSpPr>
+          <p:nvPr>
+            <p:ph type="body" sz="quarter" idx="3"/>
+          </p:nvPr>
+        </p:nvSpPr>
+        <p:spPr/>
+        <p:txBody>
+          <a:bodyPr/>
+          <a:lstStyle/>
+          <a:p>
+            <a:r>
+              <a:rPr lang="en-GB" dirty="0" smtClean="0"/>
+              <a:t>Larry</a:t>
+            </a:r>
+            <a:endParaRPr lang="en-GB" dirty="0"/>
+          </a:p>
+        </p:txBody>
+      </p:sp>
+      <p:sp>
+        <p:nvSpPr>
+          <p:cNvPr id="8" name="Content Placeholder 7"/>
+          <p:cNvSpPr>
+            <a:spLocks noGrp="1"/>
+          </p:cNvSpPr>
+          <p:nvPr>
+            <p:ph sz="quarter" idx="4"/>
+          </p:nvPr>
+        </p:nvSpPr>
+        <p:spPr/>
+        <p:txBody>
+          <a:bodyPr>
+            <a:normAutofit/>
+          </a:bodyPr>
+          <a:lstStyle/>
           <a:p>
             <a:pPr lvl="1">
               <a:buFont typeface="Arial" panose="020B0604020202020204" pitchFamily="34" charset="0"/>
               <a:buChar char="•"/>
             </a:pPr>
             <a:r>
-              <a:rPr lang="en-GB" sz="2400" dirty="0" smtClean="0"/>
-              <a:t>Dislikes spiders.</a:t>
-            </a:r>
-            <a:endParaRPr lang="en-GB" sz="2400" dirty="0"/>
-          </a:p>
-        </p:txBody>
-      </p:sp>
-      <p:sp>
-        <p:nvSpPr>
-          <p:cNvPr id="7" name="Text Placeholder 6"/>
-          <p:cNvSpPr>
-            <a:spLocks noGrp="1"/>
-          </p:cNvSpPr>
-          <p:nvPr>
-            <p:ph type="body" sz="quarter" idx="3"/>
-          </p:nvPr>
-        </p:nvSpPr>
-        <p:spPr/>
-        <p:txBody>
-          <a:bodyPr/>
-          <a:lstStyle/>
-          <a:p>
-            <a:r>
-              <a:rPr lang="en-GB" dirty="0" smtClean="0"/>
-              <a:t>Larry</a:t>
-            </a:r>
-            <a:endParaRPr lang="en-GB" dirty="0"/>
-          </a:p>
-        </p:txBody>
-      </p:sp>
-      <p:sp>
-        <p:nvSpPr>
-          <p:cNvPr id="8" name="Content Placeholder 7"/>
-          <p:cNvSpPr>
-            <a:spLocks noGrp="1"/>
-          </p:cNvSpPr>
-          <p:nvPr>
-            <p:ph sz="quarter" idx="4"/>
-          </p:nvPr>
-        </p:nvSpPr>
-        <p:spPr/>
-        <p:txBody>
-          <a:bodyPr>
-            <a:normAutofit/>
-          </a:bodyPr>
-          <a:lstStyle/>
+              <a:rPr lang="en-GB" sz="2800" dirty="0" smtClean="0"/>
+              <a:t>Likes computers.</a:t>
+            </a:r>
+          </a:p>
           <a:p>
             <a:pPr lvl="1">
               <a:buFont typeface="Arial" panose="020B0604020202020204" pitchFamily="34" charset="0"/>
@@ -12896,7 +14531,7 @@
             </a:pPr>
             <a:r>
               <a:rPr lang="en-GB" sz="2800" dirty="0" smtClean="0"/>
-              <a:t>Likes computers.</a:t>
+              <a:t>Likes sports.</a:t>
             </a:r>
           </a:p>
           <a:p>
@@ -12906,7 +14541,7 @@
             </a:pPr>
             <a:r>
               <a:rPr lang="en-GB" sz="2800" dirty="0" smtClean="0"/>
-              <a:t>Likes sports.</a:t>
+              <a:t>Dislikes tomatoes.</a:t>
             </a:r>
           </a:p>
           <a:p>
@@ -12916,23 +14551,8 @@
             </a:pPr>
             <a:r>
               <a:rPr lang="en-GB" sz="2800" dirty="0" smtClean="0"/>
-              <a:t>Dislikes tomatoes</a:t>
-            </a:r>
-            <a:r>
-              <a:rPr lang="en-GB" sz="2800" dirty="0" smtClean="0"/>
-              <a:t>.</a:t>
-            </a:r>
-          </a:p>
-          <a:p>
-            <a:pPr lvl="1">
-              <a:buFont typeface="Arial" panose="020B0604020202020204" pitchFamily="34" charset="0"/>
-              <a:buChar char="•"/>
-            </a:pPr>
-            <a:r>
-              <a:rPr lang="en-GB" sz="2800" dirty="0" smtClean="0"/>
               <a:t>Etc.</a:t>
             </a:r>
-            <a:endParaRPr lang="en-GB" sz="2800" dirty="0" smtClean="0"/>
           </a:p>
           <a:p>
             <a:pPr lvl="1">
@@ -12948,17 +14568,28 @@
             </a:pPr>
             <a:r>
               <a:rPr lang="en-GB" sz="2800" dirty="0" smtClean="0"/>
-              <a:t>Owns a pet spider.</a:t>
-            </a:r>
-          </a:p>
-          <a:p>
-            <a:pPr marL="982980" lvl="2" indent="-342900">
-              <a:buFont typeface="Arial" panose="020B0604020202020204" pitchFamily="34" charset="0"/>
-              <a:buChar char="•"/>
+              <a:t>Owns a pet spider</a:t>
+            </a:r>
+            <a:r>
+              <a:rPr lang="en-GB" sz="2800" dirty="0" smtClean="0"/>
+              <a:t>.</a:t>
+            </a:r>
+          </a:p>
+          <a:p>
+            <a:pPr marL="201168" lvl="1" indent="0">
+              <a:buNone/>
             </a:pPr>
             <a:r>
+              <a:rPr lang="en-GB" sz="2800" dirty="0"/>
+              <a:t>	</a:t>
+            </a:r>
+            <a:r>
               <a:rPr lang="en-GB" sz="2000" dirty="0" smtClean="0"/>
-              <a:t>/\(0 0)/\</a:t>
+              <a:t>/\(</a:t>
+            </a:r>
+            <a:r>
+              <a:rPr lang="en-GB" sz="2000" dirty="0" smtClean="0"/>
+              <a:t>0 0)/\</a:t>
             </a:r>
           </a:p>
         </p:txBody>
@@ -13038,11 +14669,17 @@
         </p:nvSpPr>
         <p:spPr/>
         <p:txBody>
-          <a:bodyPr/>
-          <a:lstStyle/>
-          <a:p>
-            <a:r>
-              <a:rPr lang="en-GB" dirty="0" smtClean="0"/>
+          <a:bodyPr>
+            <a:normAutofit/>
+          </a:bodyPr>
+          <a:lstStyle/>
+          <a:p>
+            <a:pPr lvl="1">
+              <a:buFont typeface="Arial" panose="020B0604020202020204" pitchFamily="34" charset="0"/>
+              <a:buChar char="•"/>
+            </a:pPr>
+            <a:r>
+              <a:rPr lang="en-GB" sz="2400" dirty="0" smtClean="0"/>
               <a:t>You add people</a:t>
             </a:r>
           </a:p>
@@ -13051,13 +14688,17 @@
               <a:buNone/>
             </a:pPr>
             <a:r>
-              <a:rPr lang="en-GB" dirty="0" smtClean="0"/>
+              <a:rPr lang="en-GB" sz="2400" dirty="0" smtClean="0"/>
               <a:t>…that the site suggests.</a:t>
             </a:r>
           </a:p>
           <a:p>
-            <a:r>
-              <a:rPr lang="en-GB" dirty="0" smtClean="0"/>
+            <a:pPr lvl="1">
+              <a:buFont typeface="Arial" panose="020B0604020202020204" pitchFamily="34" charset="0"/>
+              <a:buChar char="•"/>
+            </a:pPr>
+            <a:r>
+              <a:rPr lang="en-GB" sz="2400" dirty="0" smtClean="0"/>
               <a:t>Then you talk to them</a:t>
             </a:r>
           </a:p>
@@ -13066,16 +14707,16 @@
               <a:buNone/>
             </a:pPr>
             <a:r>
-              <a:rPr lang="en-GB" dirty="0" smtClean="0"/>
+              <a:rPr lang="en-GB" sz="2400" dirty="0" smtClean="0"/>
               <a:t>…and get to know them.</a:t>
             </a:r>
           </a:p>
           <a:p>
-            <a:endParaRPr lang="en-GB" dirty="0" smtClean="0"/>
-          </a:p>
-          <a:p>
-            <a:r>
-              <a:rPr lang="en-GB" dirty="0"/>
+            <a:endParaRPr lang="en-GB" sz="2400" dirty="0" smtClean="0"/>
+          </a:p>
+          <a:p>
+            <a:r>
+              <a:rPr lang="en-GB" sz="2400" dirty="0"/>
               <a:t>The point of adding people is because they are a potential room-mate!</a:t>
             </a:r>
           </a:p>
@@ -13159,33 +14800,49 @@
           <a:bodyPr/>
           <a:lstStyle/>
           <a:p>
-            <a:r>
-              <a:rPr lang="en-GB" dirty="0" smtClean="0"/>
+            <a:pPr lvl="1">
+              <a:buFont typeface="Arial" panose="020B0604020202020204" pitchFamily="34" charset="0"/>
+              <a:buChar char="•"/>
+            </a:pPr>
+            <a:r>
+              <a:rPr lang="en-GB" sz="2400" dirty="0" smtClean="0"/>
               <a:t>In the future, we </a:t>
             </a:r>
             <a:r>
-              <a:rPr lang="en-GB" i="1" dirty="0" smtClean="0"/>
+              <a:rPr lang="en-GB" sz="2400" i="1" dirty="0" smtClean="0"/>
               <a:t>could</a:t>
             </a:r>
             <a:r>
-              <a:rPr lang="en-GB" dirty="0" smtClean="0"/>
+              <a:rPr lang="en-GB" sz="2400" dirty="0" smtClean="0"/>
               <a:t> have instant chat.</a:t>
             </a:r>
           </a:p>
           <a:p>
-            <a:r>
-              <a:rPr lang="en-GB" dirty="0" smtClean="0"/>
+            <a:pPr lvl="1">
+              <a:buFont typeface="Arial" panose="020B0604020202020204" pitchFamily="34" charset="0"/>
+              <a:buChar char="•"/>
+            </a:pPr>
+            <a:r>
+              <a:rPr lang="en-GB" sz="2400" dirty="0" smtClean="0"/>
               <a:t>Not important, but useful.</a:t>
             </a:r>
           </a:p>
           <a:p>
-            <a:r>
-              <a:rPr lang="en-GB" dirty="0" smtClean="0"/>
+            <a:pPr lvl="1">
+              <a:buFont typeface="Arial" panose="020B0604020202020204" pitchFamily="34" charset="0"/>
+              <a:buChar char="•"/>
+            </a:pPr>
+            <a:r>
+              <a:rPr lang="en-GB" sz="2400" dirty="0" smtClean="0"/>
               <a:t>An inbox would work fine.</a:t>
             </a:r>
           </a:p>
           <a:p>
-            <a:endParaRPr lang="en-GB" dirty="0"/>
+            <a:pPr lvl="1">
+              <a:buFont typeface="Arial" panose="020B0604020202020204" pitchFamily="34" charset="0"/>
+              <a:buChar char="•"/>
+            </a:pPr>
+            <a:endParaRPr lang="en-GB" sz="2400" dirty="0"/>
           </a:p>
           <a:p>
             <a:endParaRPr lang="en-GB" dirty="0" smtClean="0"/>
@@ -13295,8 +14952,12 @@
               <a:buAutoNum type="arabicPeriod"/>
             </a:pPr>
             <a:r>
-              <a:rPr lang="en-GB" dirty="0" smtClean="0"/>
-              <a:t>People need to find room-mates.</a:t>
+              <a:rPr lang="en-GB" sz="2400" dirty="0" smtClean="0"/>
+              <a:t> People </a:t>
+            </a:r>
+            <a:r>
+              <a:rPr lang="en-GB" sz="2400" dirty="0" smtClean="0"/>
+              <a:t>need to find room-mates.</a:t>
             </a:r>
           </a:p>
           <a:p>
@@ -13305,15 +14966,15 @@
               <a:buAutoNum type="arabicPeriod"/>
             </a:pPr>
             <a:r>
-              <a:rPr lang="en-GB" dirty="0" smtClean="0"/>
-              <a:t>Finding </a:t>
-            </a:r>
-            <a:r>
-              <a:rPr lang="en-GB" i="1" dirty="0" smtClean="0"/>
+              <a:rPr lang="en-GB" sz="2400" dirty="0" smtClean="0"/>
+              <a:t> Finding </a:t>
+            </a:r>
+            <a:r>
+              <a:rPr lang="en-GB" sz="2400" i="1" dirty="0" smtClean="0"/>
               <a:t>suitable</a:t>
             </a:r>
             <a:r>
-              <a:rPr lang="en-GB" dirty="0" smtClean="0"/>
+              <a:rPr lang="en-GB" sz="2400" dirty="0" smtClean="0"/>
               <a:t> room-mates can be hard.</a:t>
             </a:r>
           </a:p>
@@ -13323,8 +14984,12 @@
               <a:buAutoNum type="arabicPeriod"/>
             </a:pPr>
             <a:r>
-              <a:rPr lang="en-GB" dirty="0" smtClean="0"/>
-              <a:t>We help them do that.</a:t>
+              <a:rPr lang="en-GB" sz="2400" dirty="0" smtClean="0"/>
+              <a:t> We </a:t>
+            </a:r>
+            <a:r>
+              <a:rPr lang="en-GB" sz="2400" dirty="0" smtClean="0"/>
+              <a:t>help them do that.</a:t>
             </a:r>
           </a:p>
           <a:p>
@@ -13333,9 +14998,10 @@
               <a:buAutoNum type="arabicPeriod"/>
             </a:pPr>
             <a:r>
-              <a:rPr lang="en-GB" dirty="0" smtClean="0"/>
-              <a:t>???</a:t>
-            </a:r>
+              <a:rPr lang="en-GB" sz="2400" dirty="0" smtClean="0"/>
+              <a:t> ???</a:t>
+            </a:r>
+            <a:endParaRPr lang="en-GB" sz="2400" dirty="0" smtClean="0"/>
           </a:p>
           <a:p>
             <a:pPr marL="514350" indent="-514350">
@@ -13343,11 +15009,19 @@
               <a:buAutoNum type="arabicPeriod"/>
             </a:pPr>
             <a:r>
-              <a:rPr lang="en-GB" strike="sngStrike" dirty="0" smtClean="0"/>
-              <a:t>Profit.</a:t>
-            </a:r>
-            <a:r>
-              <a:rPr lang="en-GB" dirty="0" smtClean="0"/>
+              <a:rPr lang="en-GB" sz="2400" dirty="0" smtClean="0"/>
+              <a:t> </a:t>
+            </a:r>
+            <a:r>
+              <a:rPr lang="en-GB" sz="2400" strike="sngStrike" dirty="0" smtClean="0"/>
+              <a:t>Profit</a:t>
+            </a:r>
+            <a:r>
+              <a:rPr lang="en-GB" sz="2400" strike="sngStrike" dirty="0" smtClean="0"/>
+              <a:t>.</a:t>
+            </a:r>
+            <a:r>
+              <a:rPr lang="en-GB" sz="2400" dirty="0" smtClean="0"/>
               <a:t> Just kidding. Maybe.</a:t>
             </a:r>
           </a:p>
@@ -13355,19 +15029,15 @@
             <a:pPr marL="0" indent="0">
               <a:buNone/>
             </a:pPr>
-            <a:endParaRPr lang="en-GB" dirty="0"/>
+            <a:endParaRPr lang="en-GB" sz="2400" dirty="0"/>
           </a:p>
           <a:p>
             <a:pPr marL="0" indent="0">
               <a:buNone/>
             </a:pPr>
             <a:r>
-              <a:rPr lang="en-GB" i="1" u="sng" dirty="0" smtClean="0"/>
-              <a:t>Ideally aimed at </a:t>
-            </a:r>
-            <a:r>
-              <a:rPr lang="en-GB" i="1" u="sng" dirty="0" smtClean="0"/>
-              <a:t>university students.</a:t>
+              <a:rPr lang="en-GB" sz="2400" i="1" u="sng" dirty="0" smtClean="0"/>
+              <a:t>Ideally aimed at university students.</a:t>
             </a:r>
           </a:p>
         </p:txBody>
@@ -13478,20 +15148,37 @@
             <p:ph sz="half" idx="14"/>
           </p:nvPr>
         </p:nvSpPr>
-        <p:spPr/>
-        <p:txBody>
-          <a:bodyPr/>
-          <a:lstStyle/>
-          <a:p>
-            <a:r>
-              <a:rPr lang="en-GB" dirty="0"/>
-              <a:t>If the user wants to get private accommodation or live in the halls on campus, this website could help them to choose which halls they’d prefer to live in with roommate(s) that have already found from roommate matcher</a:t>
-            </a:r>
-            <a:r>
-              <a:rPr lang="en-GB" dirty="0" smtClean="0"/>
-              <a:t>.</a:t>
-            </a:r>
-            <a:endParaRPr lang="en-GB" dirty="0"/>
+        <p:spPr>
+          <a:xfrm>
+            <a:off x="664690" y="4368799"/>
+            <a:ext cx="10092209" cy="1762125"/>
+          </a:xfrm>
+        </p:spPr>
+        <p:txBody>
+          <a:bodyPr>
+            <a:normAutofit/>
+          </a:bodyPr>
+          <a:lstStyle/>
+          <a:p>
+            <a:pPr>
+              <a:buFont typeface="Arial" panose="020B0604020202020204" pitchFamily="34" charset="0"/>
+              <a:buChar char="•"/>
+            </a:pPr>
+            <a:r>
+              <a:rPr lang="en-GB" sz="2400" dirty="0" smtClean="0"/>
+              <a:t>Having the possibility to look through accommodation offers as group</a:t>
+            </a:r>
+          </a:p>
+          <a:p>
+            <a:pPr>
+              <a:buFont typeface="Arial" panose="020B0604020202020204" pitchFamily="34" charset="0"/>
+              <a:buChar char="•"/>
+            </a:pPr>
+            <a:r>
+              <a:rPr lang="en-GB" sz="2400" dirty="0" smtClean="0"/>
+              <a:t>After finding perfect roommates, only thing left to do is find accommodation</a:t>
+            </a:r>
+            <a:endParaRPr lang="en-GB" sz="2400" dirty="0"/>
           </a:p>
         </p:txBody>
       </p:sp>
@@ -13598,20 +15285,29 @@
         </p:nvSpPr>
         <p:spPr/>
         <p:txBody>
-          <a:bodyPr/>
-          <a:lstStyle/>
-          <a:p>
-            <a:r>
-              <a:rPr lang="en-GB" dirty="0"/>
-              <a:t>The most important point is that </a:t>
-            </a:r>
-            <a:r>
-              <a:rPr lang="en-GB" dirty="0" smtClean="0"/>
-              <a:t>non-registered users </a:t>
-            </a:r>
-            <a:r>
-              <a:rPr lang="en-GB" dirty="0"/>
-              <a:t>can not rate or review , because it is better to be rated by the user who has already used the place before. The reviews will be done by other users of the site, i.e. those who have lived at the accommodation before. </a:t>
+          <a:bodyPr>
+            <a:normAutofit/>
+          </a:bodyPr>
+          <a:lstStyle/>
+          <a:p>
+            <a:pPr lvl="1">
+              <a:buFont typeface="Arial" panose="020B0604020202020204" pitchFamily="34" charset="0"/>
+              <a:buChar char="•"/>
+            </a:pPr>
+            <a:r>
+              <a:rPr lang="en-GB" sz="2400" dirty="0" smtClean="0"/>
+              <a:t>Avoiding spam by not letting non-registered users to rate/review.</a:t>
+            </a:r>
+            <a:endParaRPr lang="en-GB" sz="2400" dirty="0" smtClean="0"/>
+          </a:p>
+          <a:p>
+            <a:pPr lvl="1">
+              <a:buFont typeface="Arial" panose="020B0604020202020204" pitchFamily="34" charset="0"/>
+              <a:buChar char="•"/>
+            </a:pPr>
+            <a:r>
+              <a:rPr lang="en-GB" sz="2400" dirty="0" smtClean="0"/>
+              <a:t>Reviews would be checked and filtered, to assure the maximum quality.</a:t>
             </a:r>
           </a:p>
         </p:txBody>
@@ -13916,7 +15612,7 @@
   <a:extraClrSchemeLst/>
   <a:extLst>
     <a:ext uri="{05A4C25C-085E-4340-85A3-A5531E510DB2}">
-      <thm15:themeFamily xmlns:thm15="http://schemas.microsoft.com/office/thememl/2012/main" xmlns="" name="Retrospect" id="{5F128B03-DCCA-4EEB-AB3B-CF2899314A46}" vid="{3F1AAB62-24C6-49D2-8E01-B56FAC9A3DCD}"/>
+      <thm15:themeFamily xmlns:thm15="http://schemas.microsoft.com/office/thememl/2012/main" name="Retrospect" id="{5F128B03-DCCA-4EEB-AB3B-CF2899314A46}" vid="{3F1AAB62-24C6-49D2-8E01-B56FAC9A3DCD}"/>
     </a:ext>
   </a:extLst>
 </a:theme>
@@ -14462,7 +16158,7 @@
   <a:extraClrSchemeLst/>
   <a:extLst>
     <a:ext uri="{05A4C25C-085E-4340-85A3-A5531E510DB2}">
-      <thm15:themeFamily xmlns:thm15="http://schemas.microsoft.com/office/thememl/2012/main" xmlns="" name="Office Theme" id="{62F939B6-93AF-4DB8-9C6B-D6C7DFDC589F}" vid="{4A3C46E8-61CC-4603-A589-7422A47A8E4A}"/>
+      <thm15:themeFamily xmlns:thm15="http://schemas.microsoft.com/office/thememl/2012/main" name="Office Theme" id="{62F939B6-93AF-4DB8-9C6B-D6C7DFDC589F}" vid="{4A3C46E8-61CC-4603-A589-7422A47A8E4A}"/>
     </a:ext>
   </a:extLst>
 </a:theme>

</xml_diff>